<commit_message>
adding css style on html, body, main-wrapper and footer
</commit_message>
<xml_diff>
--- a/powerpoint/project4.pptx
+++ b/powerpoint/project4.pptx
@@ -17,8 +17,15 @@
     <p:sldId id="268" r:id="rId11"/>
     <p:sldId id="264" r:id="rId12"/>
     <p:sldId id="263" r:id="rId13"/>
-    <p:sldId id="265" r:id="rId14"/>
-    <p:sldId id="269" r:id="rId15"/>
+    <p:sldId id="272" r:id="rId14"/>
+    <p:sldId id="265" r:id="rId15"/>
+    <p:sldId id="273" r:id="rId16"/>
+    <p:sldId id="270" r:id="rId17"/>
+    <p:sldId id="271" r:id="rId18"/>
+    <p:sldId id="269" r:id="rId19"/>
+    <p:sldId id="276" r:id="rId20"/>
+    <p:sldId id="275" r:id="rId21"/>
+    <p:sldId id="274" r:id="rId22"/>
   </p:sldIdLst>
   <p:sldSz cx="12192000" cy="6858000"/>
   <p:notesSz cx="6858000" cy="9144000"/>
@@ -117,6 +124,11 @@
       </a:defRPr>
     </a:lvl9pPr>
   </p:defaultTextStyle>
+  <p:extLst>
+    <p:ext uri="{EFAFB233-063F-42B5-8137-9DF3F51BA10A}">
+      <p15:sldGuideLst xmlns:p15="http://schemas.microsoft.com/office/powerpoint/2012/main"/>
+    </p:ext>
+  </p:extLst>
 </p:presentation>
 </file>
 
@@ -3432,7 +3444,6 @@
               <a:rPr lang="fr-FR" dirty="0"/>
               <a:t>Billet simple pour l'Alaska</a:t>
             </a:r>
-            <a:endParaRPr lang="fr-FR" dirty="0"/>
           </a:p>
         </p:txBody>
       </p:sp>
@@ -3510,8 +3521,8 @@
         </p:nvSpPr>
         <p:spPr>
           <a:xfrm>
-            <a:off x="4323699" y="146650"/>
-            <a:ext cx="4130188" cy="584775"/>
+            <a:off x="3727159" y="48535"/>
+            <a:ext cx="4831729" cy="584775"/>
           </a:xfrm>
           <a:prstGeom prst="rect">
             <a:avLst/>
@@ -3524,12 +3535,8 @@
           <a:lstStyle/>
           <a:p>
             <a:r>
-              <a:rPr lang="fr-FR" sz="3200" dirty="0"/>
-              <a:t>Le code </a:t>
-            </a:r>
-            <a:r>
-              <a:rPr lang="fr-FR" sz="3200" dirty="0" err="1" smtClean="0"/>
-              <a:t>Php</a:t>
+              <a:rPr lang="fr-FR" sz="3200" dirty="0" smtClean="0"/>
+              <a:t>Langage serveur</a:t>
             </a:r>
             <a:endParaRPr lang="fr-FR" sz="3200" dirty="0"/>
           </a:p>
@@ -3559,8 +3566,108 @@
         </p:blipFill>
         <p:spPr>
           <a:xfrm>
-            <a:off x="3296729" y="923027"/>
-            <a:ext cx="4303462" cy="2323870"/>
+            <a:off x="4142515" y="739767"/>
+            <a:ext cx="2594350" cy="1400949"/>
+          </a:xfrm>
+          <a:prstGeom prst="rect">
+            <a:avLst/>
+          </a:prstGeom>
+        </p:spPr>
+      </p:pic>
+      <p:sp>
+        <p:nvSpPr>
+          <p:cNvPr id="4" name="ZoneTexte 3"/>
+          <p:cNvSpPr txBox="1"/>
+          <p:nvPr/>
+        </p:nvSpPr>
+        <p:spPr>
+          <a:xfrm>
+            <a:off x="4742555" y="5040043"/>
+            <a:ext cx="1646238" cy="369332"/>
+          </a:xfrm>
+          <a:prstGeom prst="rect">
+            <a:avLst/>
+          </a:prstGeom>
+          <a:noFill/>
+        </p:spPr>
+        <p:txBody>
+          <a:bodyPr wrap="square" rtlCol="0">
+            <a:spAutoFit/>
+          </a:bodyPr>
+          <a:lstStyle/>
+          <a:p>
+            <a:r>
+              <a:rPr lang="fr-FR" dirty="0" smtClean="0"/>
+              <a:t>Routeur</a:t>
+            </a:r>
+            <a:endParaRPr lang="fr-FR" dirty="0"/>
+          </a:p>
+        </p:txBody>
+      </p:sp>
+      <p:sp>
+        <p:nvSpPr>
+          <p:cNvPr id="8" name="Flèche vers le bas 7"/>
+          <p:cNvSpPr/>
+          <p:nvPr/>
+        </p:nvSpPr>
+        <p:spPr>
+          <a:xfrm>
+            <a:off x="5202866" y="2247173"/>
+            <a:ext cx="510363" cy="868695"/>
+          </a:xfrm>
+          <a:prstGeom prst="downArrow">
+            <a:avLst/>
+          </a:prstGeom>
+        </p:spPr>
+        <p:style>
+          <a:lnRef idx="2">
+            <a:schemeClr val="accent1">
+              <a:shade val="50000"/>
+            </a:schemeClr>
+          </a:lnRef>
+          <a:fillRef idx="1">
+            <a:schemeClr val="accent1"/>
+          </a:fillRef>
+          <a:effectRef idx="0">
+            <a:schemeClr val="accent1"/>
+          </a:effectRef>
+          <a:fontRef idx="minor">
+            <a:schemeClr val="lt1"/>
+          </a:fontRef>
+        </p:style>
+        <p:txBody>
+          <a:bodyPr rtlCol="0" anchor="ctr"/>
+          <a:lstStyle/>
+          <a:p>
+            <a:pPr algn="ctr"/>
+            <a:endParaRPr lang="fr-FR"/>
+          </a:p>
+        </p:txBody>
+      </p:sp>
+      <p:pic>
+        <p:nvPicPr>
+          <p:cNvPr id="11" name="Image 10"/>
+          <p:cNvPicPr>
+            <a:picLocks noChangeAspect="1"/>
+          </p:cNvPicPr>
+          <p:nvPr/>
+        </p:nvPicPr>
+        <p:blipFill>
+          <a:blip r:embed="rId4">
+            <a:extLst>
+              <a:ext uri="{28A0092B-C50C-407E-A947-70E740481C1C}">
+                <a14:useLocalDpi xmlns:a14="http://schemas.microsoft.com/office/drawing/2010/main" val="0"/>
+              </a:ext>
+            </a:extLst>
+          </a:blip>
+          <a:stretch>
+            <a:fillRect/>
+          </a:stretch>
+        </p:blipFill>
+        <p:spPr>
+          <a:xfrm>
+            <a:off x="2572459" y="3222325"/>
+            <a:ext cx="5986429" cy="3289872"/>
           </a:xfrm>
           <a:prstGeom prst="rect">
             <a:avLst/>
@@ -3577,6 +3684,13 @@
   <p:clrMapOvr>
     <a:masterClrMapping/>
   </p:clrMapOvr>
+  <p:timing>
+    <p:tnLst>
+      <p:par>
+        <p:cTn id="1" dur="indefinite" restart="never" nodeType="tmRoot"/>
+      </p:par>
+    </p:tnLst>
+  </p:timing>
 </p:sld>
 </file>
 
@@ -3609,7 +3723,7 @@
         </p:nvSpPr>
         <p:spPr>
           <a:xfrm>
-            <a:off x="3786997" y="1652091"/>
+            <a:off x="3829527" y="1120463"/>
             <a:ext cx="7062008" cy="1280890"/>
           </a:xfrm>
         </p:spPr>
@@ -3620,12 +3734,8 @@
           <a:lstStyle/>
           <a:p>
             <a:r>
-              <a:rPr lang="fr-FR" sz="4000" dirty="0"/>
-              <a:t>Le code </a:t>
-            </a:r>
-            <a:r>
-              <a:rPr lang="fr-FR" sz="4000" dirty="0" err="1" smtClean="0"/>
-              <a:t>Javascript</a:t>
+              <a:rPr lang="fr-FR" sz="4000" dirty="0" smtClean="0"/>
+              <a:t>Langages client</a:t>
             </a:r>
             <a:r>
               <a:rPr lang="fr-FR" dirty="0"/>
@@ -3653,7 +3763,7 @@
           </p:cNvPicPr>
           <p:nvPr/>
         </p:nvPicPr>
-        <p:blipFill>
+        <p:blipFill rotWithShape="1">
           <a:blip r:embed="rId2">
             <a:extLst>
               <a:ext uri="{28A0092B-C50C-407E-A947-70E740481C1C}">
@@ -3661,20 +3771,364 @@
               </a:ext>
             </a:extLst>
           </a:blip>
-          <a:stretch>
-            <a:fillRect/>
-          </a:stretch>
+          <a:srcRect l="7658" r="10807"/>
+          <a:stretch/>
         </p:blipFill>
         <p:spPr>
           <a:xfrm>
-            <a:off x="2317760" y="2932981"/>
-            <a:ext cx="7762970" cy="1787159"/>
+            <a:off x="4340803" y="4688576"/>
+            <a:ext cx="2923955" cy="1424547"/>
           </a:xfrm>
           <a:prstGeom prst="rect">
             <a:avLst/>
           </a:prstGeom>
         </p:spPr>
       </p:pic>
+      <p:sp>
+        <p:nvSpPr>
+          <p:cNvPr id="2" name="Flèche vers le bas 1"/>
+          <p:cNvSpPr/>
+          <p:nvPr/>
+        </p:nvSpPr>
+        <p:spPr>
+          <a:xfrm rot="1852428">
+            <a:off x="2773600" y="971105"/>
+            <a:ext cx="432391" cy="1049079"/>
+          </a:xfrm>
+          <a:prstGeom prst="downArrow">
+            <a:avLst/>
+          </a:prstGeom>
+        </p:spPr>
+        <p:style>
+          <a:lnRef idx="2">
+            <a:schemeClr val="accent1">
+              <a:shade val="50000"/>
+            </a:schemeClr>
+          </a:lnRef>
+          <a:fillRef idx="1">
+            <a:schemeClr val="accent1"/>
+          </a:fillRef>
+          <a:effectRef idx="0">
+            <a:schemeClr val="accent1"/>
+          </a:effectRef>
+          <a:fontRef idx="minor">
+            <a:schemeClr val="lt1"/>
+          </a:fontRef>
+        </p:style>
+        <p:txBody>
+          <a:bodyPr rtlCol="0" anchor="ctr"/>
+          <a:lstStyle/>
+          <a:p>
+            <a:pPr algn="ctr"/>
+            <a:endParaRPr lang="fr-FR"/>
+          </a:p>
+        </p:txBody>
+      </p:sp>
+      <p:sp>
+        <p:nvSpPr>
+          <p:cNvPr id="5" name="Flèche vers le bas 4"/>
+          <p:cNvSpPr/>
+          <p:nvPr/>
+        </p:nvSpPr>
+        <p:spPr>
+          <a:xfrm>
+            <a:off x="5370390" y="971106"/>
+            <a:ext cx="432391" cy="1049079"/>
+          </a:xfrm>
+          <a:prstGeom prst="downArrow">
+            <a:avLst/>
+          </a:prstGeom>
+        </p:spPr>
+        <p:style>
+          <a:lnRef idx="2">
+            <a:schemeClr val="accent1">
+              <a:shade val="50000"/>
+            </a:schemeClr>
+          </a:lnRef>
+          <a:fillRef idx="1">
+            <a:schemeClr val="accent1"/>
+          </a:fillRef>
+          <a:effectRef idx="0">
+            <a:schemeClr val="accent1"/>
+          </a:effectRef>
+          <a:fontRef idx="minor">
+            <a:schemeClr val="lt1"/>
+          </a:fontRef>
+        </p:style>
+        <p:txBody>
+          <a:bodyPr rtlCol="0" anchor="ctr"/>
+          <a:lstStyle/>
+          <a:p>
+            <a:pPr algn="ctr"/>
+            <a:endParaRPr lang="fr-FR"/>
+          </a:p>
+        </p:txBody>
+      </p:sp>
+      <p:sp>
+        <p:nvSpPr>
+          <p:cNvPr id="7" name="Flèche vers le bas 6"/>
+          <p:cNvSpPr/>
+          <p:nvPr/>
+        </p:nvSpPr>
+        <p:spPr>
+          <a:xfrm rot="19778520">
+            <a:off x="7984158" y="971105"/>
+            <a:ext cx="432391" cy="1049079"/>
+          </a:xfrm>
+          <a:prstGeom prst="downArrow">
+            <a:avLst/>
+          </a:prstGeom>
+        </p:spPr>
+        <p:style>
+          <a:lnRef idx="2">
+            <a:schemeClr val="accent1">
+              <a:shade val="50000"/>
+            </a:schemeClr>
+          </a:lnRef>
+          <a:fillRef idx="1">
+            <a:schemeClr val="accent1"/>
+          </a:fillRef>
+          <a:effectRef idx="0">
+            <a:schemeClr val="accent1"/>
+          </a:effectRef>
+          <a:fontRef idx="minor">
+            <a:schemeClr val="lt1"/>
+          </a:fontRef>
+        </p:style>
+        <p:txBody>
+          <a:bodyPr rtlCol="0" anchor="ctr"/>
+          <a:lstStyle/>
+          <a:p>
+            <a:pPr algn="ctr"/>
+            <a:endParaRPr lang="fr-FR"/>
+          </a:p>
+        </p:txBody>
+      </p:sp>
+      <p:pic>
+        <p:nvPicPr>
+          <p:cNvPr id="3" name="Image 2"/>
+          <p:cNvPicPr>
+            <a:picLocks noChangeAspect="1"/>
+          </p:cNvPicPr>
+          <p:nvPr/>
+        </p:nvPicPr>
+        <p:blipFill rotWithShape="1">
+          <a:blip r:embed="rId3">
+            <a:extLst>
+              <a:ext uri="{28A0092B-C50C-407E-A947-70E740481C1C}">
+                <a14:useLocalDpi xmlns:a14="http://schemas.microsoft.com/office/drawing/2010/main" val="0"/>
+              </a:ext>
+            </a:extLst>
+          </a:blip>
+          <a:srcRect l="54512" t="8271" r="8429" b="41946"/>
+          <a:stretch/>
+        </p:blipFill>
+        <p:spPr>
+          <a:xfrm>
+            <a:off x="8127766" y="2244228"/>
+            <a:ext cx="1443761" cy="1939473"/>
+          </a:xfrm>
+          <a:prstGeom prst="rect">
+            <a:avLst/>
+          </a:prstGeom>
+        </p:spPr>
+      </p:pic>
+      <p:pic>
+        <p:nvPicPr>
+          <p:cNvPr id="8" name="Image 7"/>
+          <p:cNvPicPr>
+            <a:picLocks noChangeAspect="1"/>
+          </p:cNvPicPr>
+          <p:nvPr/>
+        </p:nvPicPr>
+        <p:blipFill rotWithShape="1">
+          <a:blip r:embed="rId3">
+            <a:extLst>
+              <a:ext uri="{28A0092B-C50C-407E-A947-70E740481C1C}">
+                <a14:useLocalDpi xmlns:a14="http://schemas.microsoft.com/office/drawing/2010/main" val="0"/>
+              </a:ext>
+            </a:extLst>
+          </a:blip>
+          <a:srcRect l="10827" t="2378" r="54030" b="41498"/>
+          <a:stretch/>
+        </p:blipFill>
+        <p:spPr>
+          <a:xfrm>
+            <a:off x="1184402" y="2020185"/>
+            <a:ext cx="1398415" cy="2233349"/>
+          </a:xfrm>
+          <a:prstGeom prst="rect">
+            <a:avLst/>
+          </a:prstGeom>
+        </p:spPr>
+      </p:pic>
+      <p:pic>
+        <p:nvPicPr>
+          <p:cNvPr id="9" name="Image 8"/>
+          <p:cNvPicPr>
+            <a:picLocks noChangeAspect="1"/>
+          </p:cNvPicPr>
+          <p:nvPr/>
+        </p:nvPicPr>
+        <p:blipFill rotWithShape="1">
+          <a:blip r:embed="rId3">
+            <a:extLst>
+              <a:ext uri="{28A0092B-C50C-407E-A947-70E740481C1C}">
+                <a14:useLocalDpi xmlns:a14="http://schemas.microsoft.com/office/drawing/2010/main" val="0"/>
+              </a:ext>
+            </a:extLst>
+          </a:blip>
+          <a:srcRect l="29292" t="50830" r="29708" b="-1"/>
+          <a:stretch/>
+        </p:blipFill>
+        <p:spPr>
+          <a:xfrm>
+            <a:off x="4794785" y="2354315"/>
+            <a:ext cx="1583599" cy="1899219"/>
+          </a:xfrm>
+          <a:prstGeom prst="ellipse">
+            <a:avLst/>
+          </a:prstGeom>
+        </p:spPr>
+      </p:pic>
+      <p:sp>
+        <p:nvSpPr>
+          <p:cNvPr id="10" name="ZoneTexte 9">
+            <a:hlinkClick r:id="rId4" action="ppaction://hlinkfile"/>
+          </p:cNvPr>
+          <p:cNvSpPr txBox="1"/>
+          <p:nvPr/>
+        </p:nvSpPr>
+        <p:spPr>
+          <a:xfrm>
+            <a:off x="914400" y="4401879"/>
+            <a:ext cx="2530123" cy="369332"/>
+          </a:xfrm>
+          <a:prstGeom prst="rect">
+            <a:avLst/>
+          </a:prstGeom>
+          <a:noFill/>
+        </p:spPr>
+        <p:txBody>
+          <a:bodyPr wrap="square" rtlCol="0">
+            <a:spAutoFit/>
+          </a:bodyPr>
+          <a:lstStyle/>
+          <a:p>
+            <a:r>
+              <a:rPr lang="fr-FR" dirty="0" smtClean="0"/>
+              <a:t>Template </a:t>
+            </a:r>
+            <a:r>
+              <a:rPr lang="fr-FR" dirty="0" err="1" smtClean="0"/>
+              <a:t>frontend</a:t>
+            </a:r>
+            <a:endParaRPr lang="fr-FR" dirty="0"/>
+          </a:p>
+        </p:txBody>
+      </p:sp>
+      <p:sp>
+        <p:nvSpPr>
+          <p:cNvPr id="12" name="ZoneTexte 11">
+            <a:hlinkClick r:id="rId5" action="ppaction://hlinkfile"/>
+          </p:cNvPr>
+          <p:cNvSpPr txBox="1"/>
+          <p:nvPr/>
+        </p:nvSpPr>
+        <p:spPr>
+          <a:xfrm>
+            <a:off x="1724733" y="5750143"/>
+            <a:ext cx="2530123" cy="369332"/>
+          </a:xfrm>
+          <a:prstGeom prst="rect">
+            <a:avLst/>
+          </a:prstGeom>
+          <a:noFill/>
+        </p:spPr>
+        <p:txBody>
+          <a:bodyPr wrap="square" rtlCol="0">
+            <a:spAutoFit/>
+          </a:bodyPr>
+          <a:lstStyle/>
+          <a:p>
+            <a:r>
+              <a:rPr lang="fr-FR" dirty="0" err="1"/>
+              <a:t>v</a:t>
+            </a:r>
+            <a:r>
+              <a:rPr lang="fr-FR" dirty="0" err="1" smtClean="0"/>
+              <a:t>iew</a:t>
+            </a:r>
+            <a:endParaRPr lang="fr-FR" dirty="0"/>
+          </a:p>
+        </p:txBody>
+      </p:sp>
+      <p:sp>
+        <p:nvSpPr>
+          <p:cNvPr id="13" name="ZoneTexte 12"/>
+          <p:cNvSpPr txBox="1"/>
+          <p:nvPr/>
+        </p:nvSpPr>
+        <p:spPr>
+          <a:xfrm>
+            <a:off x="914400" y="5076011"/>
+            <a:ext cx="2530123" cy="369332"/>
+          </a:xfrm>
+          <a:prstGeom prst="rect">
+            <a:avLst/>
+          </a:prstGeom>
+          <a:noFill/>
+        </p:spPr>
+        <p:txBody>
+          <a:bodyPr wrap="square" rtlCol="0">
+            <a:spAutoFit/>
+          </a:bodyPr>
+          <a:lstStyle/>
+          <a:p>
+            <a:r>
+              <a:rPr lang="fr-FR" dirty="0" smtClean="0"/>
+              <a:t>Template </a:t>
+            </a:r>
+            <a:r>
+              <a:rPr lang="fr-FR" dirty="0" err="1" smtClean="0"/>
+              <a:t>backend</a:t>
+            </a:r>
+            <a:endParaRPr lang="fr-FR" dirty="0"/>
+          </a:p>
+        </p:txBody>
+      </p:sp>
+      <p:sp>
+        <p:nvSpPr>
+          <p:cNvPr id="14" name="ZoneTexte 13">
+            <a:hlinkClick r:id="rId6" action="ppaction://hlinkfile"/>
+          </p:cNvPr>
+          <p:cNvSpPr txBox="1"/>
+          <p:nvPr/>
+        </p:nvSpPr>
+        <p:spPr>
+          <a:xfrm>
+            <a:off x="8849646" y="4938134"/>
+            <a:ext cx="2247014" cy="369332"/>
+          </a:xfrm>
+          <a:prstGeom prst="rect">
+            <a:avLst/>
+          </a:prstGeom>
+          <a:noFill/>
+        </p:spPr>
+        <p:txBody>
+          <a:bodyPr wrap="square" rtlCol="0">
+            <a:spAutoFit/>
+          </a:bodyPr>
+          <a:lstStyle/>
+          <a:p>
+            <a:r>
+              <a:rPr lang="fr-FR" dirty="0" smtClean="0"/>
+              <a:t>Style.css</a:t>
+            </a:r>
+            <a:endParaRPr lang="fr-FR" dirty="0"/>
+          </a:p>
+        </p:txBody>
+      </p:sp>
     </p:spTree>
     <p:extLst>
       <p:ext uri="{BB962C8B-B14F-4D97-AF65-F5344CB8AC3E}">
@@ -3685,6 +4139,13 @@
   <p:clrMapOvr>
     <a:masterClrMapping/>
   </p:clrMapOvr>
+  <p:timing>
+    <p:tnLst>
+      <p:par>
+        <p:cTn id="1" dur="indefinite" restart="never" nodeType="tmRoot"/>
+      </p:par>
+    </p:tnLst>
+  </p:timing>
 </p:sld>
 </file>
 
@@ -3750,7 +4211,7 @@
         </p:nvSpPr>
         <p:spPr>
           <a:xfrm>
-            <a:off x="4601230" y="5717788"/>
+            <a:off x="4552109" y="5739053"/>
             <a:ext cx="1915064" cy="369332"/>
           </a:xfrm>
           <a:prstGeom prst="rect">
@@ -4263,52 +4724,54 @@
       </p:grpSpPr>
       <p:sp>
         <p:nvSpPr>
-          <p:cNvPr id="4" name="Rectangle 3"/>
+          <p:cNvPr id="4" name="Titre 1"/>
+          <p:cNvSpPr>
+            <a:spLocks noGrp="1"/>
+          </p:cNvSpPr>
+          <p:nvPr>
+            <p:ph type="title"/>
+          </p:nvPr>
+        </p:nvSpPr>
+        <p:spPr>
+          <a:xfrm>
+            <a:off x="4438750" y="89204"/>
+            <a:ext cx="8915399" cy="1265942"/>
+          </a:xfrm>
+        </p:spPr>
+        <p:txBody>
+          <a:bodyPr>
+            <a:normAutofit fontScale="90000"/>
+          </a:bodyPr>
+          <a:lstStyle/>
+          <a:p>
+            <a:r>
+              <a:rPr lang="fr-FR" sz="3600" dirty="0" smtClean="0"/>
+              <a:t>Design pattern </a:t>
+            </a:r>
+            <a:r>
+              <a:rPr lang="fr-FR" sz="5400" dirty="0"/>
+              <a:t/>
+            </a:r>
+            <a:br>
+              <a:rPr lang="fr-FR" sz="5400" dirty="0"/>
+            </a:br>
+            <a:endParaRPr lang="fr-FR" dirty="0"/>
+          </a:p>
+        </p:txBody>
+      </p:sp>
+      <p:sp>
+        <p:nvSpPr>
+          <p:cNvPr id="6" name="Rectangle à coins arrondis 5"/>
           <p:cNvSpPr/>
           <p:nvPr/>
         </p:nvSpPr>
         <p:spPr>
           <a:xfrm>
-            <a:off x="2162603" y="267420"/>
-            <a:ext cx="8249479" cy="707886"/>
-          </a:xfrm>
-          <a:prstGeom prst="rect">
-            <a:avLst/>
-          </a:prstGeom>
-        </p:spPr>
-        <p:txBody>
-          <a:bodyPr wrap="square">
-            <a:spAutoFit/>
-          </a:bodyPr>
-          <a:lstStyle/>
-          <a:p>
-            <a:r>
-              <a:rPr lang="fr-FR" sz="4000" dirty="0"/>
-              <a:t>Programmation orientée objet</a:t>
-            </a:r>
-          </a:p>
-        </p:txBody>
-      </p:sp>
-      <p:sp>
-        <p:nvSpPr>
-          <p:cNvPr id="8" name="Légende encadrée 2 7"/>
-          <p:cNvSpPr/>
-          <p:nvPr/>
-        </p:nvSpPr>
-        <p:spPr>
-          <a:xfrm rot="10800000">
-            <a:off x="1630392" y="1500996"/>
-            <a:ext cx="2631057" cy="1604513"/>
-          </a:xfrm>
-          <a:prstGeom prst="borderCallout2">
-            <a:avLst>
-              <a:gd name="adj1" fmla="val 19288"/>
-              <a:gd name="adj2" fmla="val -464"/>
-              <a:gd name="adj3" fmla="val 18750"/>
-              <a:gd name="adj4" fmla="val -16667"/>
-              <a:gd name="adj5" fmla="val 112500"/>
-              <a:gd name="adj6" fmla="val -46667"/>
-            </a:avLst>
+            <a:off x="4499001" y="1198901"/>
+            <a:ext cx="2806994" cy="581247"/>
+          </a:xfrm>
+          <a:prstGeom prst="roundRect">
+            <a:avLst/>
           </a:prstGeom>
         </p:spPr>
         <p:style>
@@ -4338,24 +4801,47 @@
       </p:sp>
       <p:sp>
         <p:nvSpPr>
-          <p:cNvPr id="9" name="Légende encadrée 2 8"/>
+          <p:cNvPr id="7" name="ZoneTexte 6"/>
+          <p:cNvSpPr txBox="1"/>
+          <p:nvPr/>
+        </p:nvSpPr>
+        <p:spPr>
+          <a:xfrm>
+            <a:off x="5526813" y="727218"/>
+            <a:ext cx="1389321" cy="369332"/>
+          </a:xfrm>
+          <a:prstGeom prst="rect">
+            <a:avLst/>
+          </a:prstGeom>
+          <a:noFill/>
+        </p:spPr>
+        <p:txBody>
+          <a:bodyPr wrap="square" rtlCol="0">
+            <a:spAutoFit/>
+          </a:bodyPr>
+          <a:lstStyle/>
+          <a:p>
+            <a:r>
+              <a:rPr lang="fr-FR" dirty="0" smtClean="0"/>
+              <a:t>MVC</a:t>
+            </a:r>
+            <a:endParaRPr lang="fr-FR" dirty="0"/>
+          </a:p>
+        </p:txBody>
+      </p:sp>
+      <p:sp>
+        <p:nvSpPr>
+          <p:cNvPr id="8" name="Rectangle à coins arrondis 7"/>
           <p:cNvSpPr/>
           <p:nvPr/>
         </p:nvSpPr>
         <p:spPr>
-          <a:xfrm rot="10800000">
-            <a:off x="7545238" y="1411856"/>
-            <a:ext cx="2631057" cy="1604513"/>
-          </a:xfrm>
-          <a:prstGeom prst="borderCallout2">
-            <a:avLst>
-              <a:gd name="adj1" fmla="val 13374"/>
-              <a:gd name="adj2" fmla="val 100192"/>
-              <a:gd name="adj3" fmla="val 16599"/>
-              <a:gd name="adj4" fmla="val 118743"/>
-              <a:gd name="adj5" fmla="val 106586"/>
-              <a:gd name="adj6" fmla="val 150382"/>
-            </a:avLst>
+          <a:xfrm>
+            <a:off x="552892" y="1822317"/>
+            <a:ext cx="2806994" cy="1144465"/>
+          </a:xfrm>
+          <a:prstGeom prst="roundRect">
+            <a:avLst/>
           </a:prstGeom>
         </p:spPr>
         <p:style>
@@ -4385,84 +4871,16 @@
       </p:sp>
       <p:sp>
         <p:nvSpPr>
-          <p:cNvPr id="10" name="ZoneTexte 9"/>
-          <p:cNvSpPr txBox="1"/>
-          <p:nvPr/>
-        </p:nvSpPr>
-        <p:spPr>
-          <a:xfrm>
-            <a:off x="8440946" y="2029446"/>
-            <a:ext cx="1587260" cy="369332"/>
-          </a:xfrm>
-          <a:prstGeom prst="rect">
-            <a:avLst/>
-          </a:prstGeom>
-          <a:noFill/>
-        </p:spPr>
-        <p:txBody>
-          <a:bodyPr wrap="square" rtlCol="0">
-            <a:spAutoFit/>
-          </a:bodyPr>
-          <a:lstStyle/>
-          <a:p>
-            <a:r>
-              <a:rPr lang="fr-FR" dirty="0" smtClean="0"/>
-              <a:t>Model</a:t>
-            </a:r>
-            <a:endParaRPr lang="fr-FR" dirty="0"/>
-          </a:p>
-        </p:txBody>
-      </p:sp>
-      <p:sp>
-        <p:nvSpPr>
-          <p:cNvPr id="13" name="ZoneTexte 12"/>
-          <p:cNvSpPr txBox="1"/>
-          <p:nvPr/>
-        </p:nvSpPr>
-        <p:spPr>
-          <a:xfrm>
-            <a:off x="2300378" y="2074125"/>
-            <a:ext cx="1846053" cy="369332"/>
-          </a:xfrm>
-          <a:prstGeom prst="rect">
-            <a:avLst/>
-          </a:prstGeom>
-          <a:noFill/>
-        </p:spPr>
-        <p:txBody>
-          <a:bodyPr wrap="square" rtlCol="0">
-            <a:spAutoFit/>
-          </a:bodyPr>
-          <a:lstStyle/>
-          <a:p>
-            <a:r>
-              <a:rPr lang="fr-FR" dirty="0" smtClean="0">
-                <a:solidFill>
-                  <a:schemeClr val="bg1"/>
-                </a:solidFill>
-              </a:rPr>
-              <a:t>Controller</a:t>
-            </a:r>
-            <a:endParaRPr lang="fr-FR" dirty="0">
-              <a:solidFill>
-                <a:schemeClr val="bg1"/>
-              </a:solidFill>
-            </a:endParaRPr>
-          </a:p>
-        </p:txBody>
-      </p:sp>
-      <p:sp>
-        <p:nvSpPr>
-          <p:cNvPr id="16" name="Rectangle 15"/>
+          <p:cNvPr id="9" name="Rectangle à coins arrondis 8"/>
           <p:cNvSpPr/>
           <p:nvPr/>
         </p:nvSpPr>
         <p:spPr>
           <a:xfrm>
-            <a:off x="2040145" y="3711539"/>
-            <a:ext cx="1858993" cy="1202644"/>
-          </a:xfrm>
-          <a:prstGeom prst="rect">
+            <a:off x="4499001" y="2409441"/>
+            <a:ext cx="2806994" cy="581247"/>
+          </a:xfrm>
+          <a:prstGeom prst="roundRect">
             <a:avLst/>
           </a:prstGeom>
         </p:spPr>
@@ -4493,54 +4911,16 @@
       </p:sp>
       <p:sp>
         <p:nvSpPr>
-          <p:cNvPr id="17" name="ZoneTexte 16"/>
-          <p:cNvSpPr txBox="1"/>
-          <p:nvPr/>
-        </p:nvSpPr>
-        <p:spPr>
-          <a:xfrm>
-            <a:off x="2585049" y="4046979"/>
-            <a:ext cx="2165231" cy="369332"/>
-          </a:xfrm>
-          <a:prstGeom prst="rect">
-            <a:avLst/>
-          </a:prstGeom>
-          <a:noFill/>
-        </p:spPr>
-        <p:txBody>
-          <a:bodyPr wrap="square" rtlCol="0">
-            <a:spAutoFit/>
-          </a:bodyPr>
-          <a:lstStyle/>
-          <a:p>
-            <a:r>
-              <a:rPr lang="fr-FR" dirty="0" smtClean="0">
-                <a:solidFill>
-                  <a:schemeClr val="bg1"/>
-                </a:solidFill>
-              </a:rPr>
-              <a:t>Class</a:t>
-            </a:r>
-            <a:endParaRPr lang="fr-FR" dirty="0">
-              <a:solidFill>
-                <a:schemeClr val="bg1"/>
-              </a:solidFill>
-            </a:endParaRPr>
-          </a:p>
-        </p:txBody>
-      </p:sp>
-      <p:sp>
-        <p:nvSpPr>
-          <p:cNvPr id="24" name="Flèche vers le bas 23"/>
+          <p:cNvPr id="10" name="Rectangle à coins arrondis 9"/>
           <p:cNvSpPr/>
           <p:nvPr/>
         </p:nvSpPr>
         <p:spPr>
           <a:xfrm>
-            <a:off x="2760452" y="5018405"/>
-            <a:ext cx="370936" cy="584935"/>
-          </a:xfrm>
-          <a:prstGeom prst="downArrow">
+            <a:off x="8274016" y="1913159"/>
+            <a:ext cx="2806994" cy="1053624"/>
+          </a:xfrm>
+          <a:prstGeom prst="roundRect">
             <a:avLst/>
           </a:prstGeom>
         </p:spPr>
@@ -4571,14 +4951,14 @@
       </p:sp>
       <p:sp>
         <p:nvSpPr>
-          <p:cNvPr id="25" name="ZoneTexte 24"/>
+          <p:cNvPr id="11" name="ZoneTexte 10"/>
           <p:cNvSpPr txBox="1"/>
           <p:nvPr/>
         </p:nvSpPr>
         <p:spPr>
           <a:xfrm>
-            <a:off x="1817546" y="5707563"/>
-            <a:ext cx="2443903" cy="369332"/>
+            <a:off x="5041261" y="1148265"/>
+            <a:ext cx="1722474" cy="646331"/>
           </a:xfrm>
           <a:prstGeom prst="rect">
             <a:avLst/>
@@ -4591,26 +4971,216 @@
           </a:bodyPr>
           <a:lstStyle/>
           <a:p>
-            <a:r>
-              <a:rPr lang="fr-FR" dirty="0" err="1" smtClean="0"/>
-              <a:t>controllerFrontend</a:t>
-            </a:r>
-            <a:endParaRPr lang="fr-FR" dirty="0"/>
-          </a:p>
-        </p:txBody>
-      </p:sp>
-      <p:sp>
-        <p:nvSpPr>
-          <p:cNvPr id="26" name="Flèche vers le bas 25"/>
+            <a:pPr algn="ctr"/>
+            <a:r>
+              <a:rPr lang="fr-FR" dirty="0" smtClean="0">
+                <a:solidFill>
+                  <a:schemeClr val="bg1"/>
+                </a:solidFill>
+              </a:rPr>
+              <a:t>Routeur</a:t>
+            </a:r>
+          </a:p>
+          <a:p>
+            <a:pPr algn="ctr"/>
+            <a:r>
+              <a:rPr lang="fr-FR" dirty="0" smtClean="0">
+                <a:solidFill>
+                  <a:schemeClr val="bg1"/>
+                </a:solidFill>
+              </a:rPr>
+              <a:t>(</a:t>
+            </a:r>
+            <a:r>
+              <a:rPr lang="fr-FR" dirty="0" err="1" smtClean="0">
+                <a:solidFill>
+                  <a:schemeClr val="bg1"/>
+                </a:solidFill>
+              </a:rPr>
+              <a:t>index.php</a:t>
+            </a:r>
+            <a:r>
+              <a:rPr lang="fr-FR" dirty="0" smtClean="0">
+                <a:solidFill>
+                  <a:schemeClr val="bg1"/>
+                </a:solidFill>
+              </a:rPr>
+              <a:t>)</a:t>
+            </a:r>
+            <a:endParaRPr lang="fr-FR" dirty="0">
+              <a:solidFill>
+                <a:schemeClr val="bg1"/>
+              </a:solidFill>
+            </a:endParaRPr>
+          </a:p>
+        </p:txBody>
+      </p:sp>
+      <p:sp>
+        <p:nvSpPr>
+          <p:cNvPr id="12" name="ZoneTexte 11"/>
+          <p:cNvSpPr txBox="1"/>
+          <p:nvPr/>
+        </p:nvSpPr>
+        <p:spPr>
+          <a:xfrm>
+            <a:off x="5193661" y="2515398"/>
+            <a:ext cx="2055627" cy="369332"/>
+          </a:xfrm>
+          <a:prstGeom prst="rect">
+            <a:avLst/>
+          </a:prstGeom>
+          <a:noFill/>
+        </p:spPr>
+        <p:txBody>
+          <a:bodyPr wrap="square" rtlCol="0">
+            <a:spAutoFit/>
+          </a:bodyPr>
+          <a:lstStyle/>
+          <a:p>
+            <a:r>
+              <a:rPr lang="fr-FR" dirty="0" smtClean="0">
+                <a:solidFill>
+                  <a:schemeClr val="bg1"/>
+                </a:solidFill>
+              </a:rPr>
+              <a:t>Controller</a:t>
+            </a:r>
+            <a:endParaRPr lang="fr-FR" dirty="0">
+              <a:solidFill>
+                <a:schemeClr val="bg1"/>
+              </a:solidFill>
+            </a:endParaRPr>
+          </a:p>
+        </p:txBody>
+      </p:sp>
+      <p:sp>
+        <p:nvSpPr>
+          <p:cNvPr id="13" name="ZoneTexte 12"/>
+          <p:cNvSpPr txBox="1"/>
+          <p:nvPr/>
+        </p:nvSpPr>
+        <p:spPr>
+          <a:xfrm>
+            <a:off x="961900" y="1981130"/>
+            <a:ext cx="1913861" cy="646331"/>
+          </a:xfrm>
+          <a:prstGeom prst="rect">
+            <a:avLst/>
+          </a:prstGeom>
+          <a:noFill/>
+        </p:spPr>
+        <p:txBody>
+          <a:bodyPr wrap="square" rtlCol="0">
+            <a:spAutoFit/>
+          </a:bodyPr>
+          <a:lstStyle/>
+          <a:p>
+            <a:pPr algn="ctr"/>
+            <a:r>
+              <a:rPr lang="fr-FR" dirty="0" smtClean="0">
+                <a:solidFill>
+                  <a:schemeClr val="bg1"/>
+                </a:solidFill>
+              </a:rPr>
+              <a:t>Public</a:t>
+            </a:r>
+          </a:p>
+          <a:p>
+            <a:pPr algn="ctr"/>
+            <a:r>
+              <a:rPr lang="fr-FR" dirty="0" smtClean="0">
+                <a:solidFill>
+                  <a:schemeClr val="bg1"/>
+                </a:solidFill>
+              </a:rPr>
+              <a:t>(</a:t>
+            </a:r>
+            <a:r>
+              <a:rPr lang="fr-FR" dirty="0" err="1" smtClean="0">
+                <a:solidFill>
+                  <a:schemeClr val="bg1"/>
+                </a:solidFill>
+              </a:rPr>
+              <a:t>css,images,js</a:t>
+            </a:r>
+            <a:r>
+              <a:rPr lang="fr-FR" dirty="0" smtClean="0">
+                <a:solidFill>
+                  <a:schemeClr val="bg1"/>
+                </a:solidFill>
+              </a:rPr>
+              <a:t>)</a:t>
+            </a:r>
+            <a:endParaRPr lang="fr-FR" dirty="0">
+              <a:solidFill>
+                <a:schemeClr val="bg1"/>
+              </a:solidFill>
+            </a:endParaRPr>
+          </a:p>
+        </p:txBody>
+      </p:sp>
+      <p:sp>
+        <p:nvSpPr>
+          <p:cNvPr id="14" name="ZoneTexte 13"/>
+          <p:cNvSpPr txBox="1"/>
+          <p:nvPr/>
+        </p:nvSpPr>
+        <p:spPr>
+          <a:xfrm>
+            <a:off x="8660331" y="1971202"/>
+            <a:ext cx="2147777" cy="646331"/>
+          </a:xfrm>
+          <a:prstGeom prst="rect">
+            <a:avLst/>
+          </a:prstGeom>
+          <a:noFill/>
+        </p:spPr>
+        <p:txBody>
+          <a:bodyPr wrap="square" rtlCol="0">
+            <a:spAutoFit/>
+          </a:bodyPr>
+          <a:lstStyle/>
+          <a:p>
+            <a:pPr algn="ctr"/>
+            <a:r>
+              <a:rPr lang="fr-FR" dirty="0" smtClean="0">
+                <a:solidFill>
+                  <a:schemeClr val="bg1"/>
+                </a:solidFill>
+              </a:rPr>
+              <a:t>Services</a:t>
+            </a:r>
+          </a:p>
+          <a:p>
+            <a:pPr algn="ctr"/>
+            <a:r>
+              <a:rPr lang="fr-FR" dirty="0" smtClean="0">
+                <a:solidFill>
+                  <a:schemeClr val="bg1"/>
+                </a:solidFill>
+              </a:rPr>
+              <a:t>(2 middlewares)</a:t>
+            </a:r>
+            <a:endParaRPr lang="fr-FR" dirty="0">
+              <a:solidFill>
+                <a:schemeClr val="bg1"/>
+              </a:solidFill>
+            </a:endParaRPr>
+          </a:p>
+        </p:txBody>
+      </p:sp>
+      <p:sp>
+        <p:nvSpPr>
+          <p:cNvPr id="15" name="Rectangle à coins arrondis 14"/>
           <p:cNvSpPr/>
           <p:nvPr/>
         </p:nvSpPr>
         <p:spPr>
           <a:xfrm>
-            <a:off x="2784174" y="3158952"/>
-            <a:ext cx="284673" cy="455670"/>
-          </a:xfrm>
-          <a:prstGeom prst="downArrow">
+            <a:off x="4499001" y="2373781"/>
+            <a:ext cx="2806994" cy="1238463"/>
+          </a:xfrm>
+          <a:prstGeom prst="roundRect">
             <a:avLst/>
           </a:prstGeom>
         </p:spPr>
@@ -4641,16 +5211,54 @@
       </p:sp>
       <p:sp>
         <p:nvSpPr>
-          <p:cNvPr id="27" name="Flèche vers le bas 26"/>
+          <p:cNvPr id="16" name="ZoneTexte 15"/>
+          <p:cNvSpPr txBox="1"/>
+          <p:nvPr/>
+        </p:nvSpPr>
+        <p:spPr>
+          <a:xfrm>
+            <a:off x="5193661" y="2741162"/>
+            <a:ext cx="2055627" cy="369332"/>
+          </a:xfrm>
+          <a:prstGeom prst="rect">
+            <a:avLst/>
+          </a:prstGeom>
+          <a:noFill/>
+        </p:spPr>
+        <p:txBody>
+          <a:bodyPr wrap="square" rtlCol="0">
+            <a:spAutoFit/>
+          </a:bodyPr>
+          <a:lstStyle/>
+          <a:p>
+            <a:r>
+              <a:rPr lang="fr-FR" dirty="0" smtClean="0">
+                <a:solidFill>
+                  <a:schemeClr val="bg1"/>
+                </a:solidFill>
+              </a:rPr>
+              <a:t>Contrôleur</a:t>
+            </a:r>
+            <a:endParaRPr lang="fr-FR" dirty="0">
+              <a:solidFill>
+                <a:schemeClr val="bg1"/>
+              </a:solidFill>
+            </a:endParaRPr>
+          </a:p>
+        </p:txBody>
+      </p:sp>
+      <p:sp>
+        <p:nvSpPr>
+          <p:cNvPr id="17" name="Rectangle à coins arrondis 16"/>
           <p:cNvSpPr/>
           <p:nvPr/>
         </p:nvSpPr>
         <p:spPr>
-          <a:xfrm rot="16200000">
-            <a:off x="5713980" y="5364581"/>
-            <a:ext cx="370936" cy="1468536"/>
-          </a:xfrm>
-          <a:prstGeom prst="downArrow">
+          <a:xfrm>
+            <a:off x="4613388" y="4496510"/>
+            <a:ext cx="2806994" cy="1521518"/>
+          </a:xfrm>
+          <a:prstGeom prst="roundRect">
             <a:avLst/>
           </a:prstGeom>
         </p:spPr>
@@ -4681,14 +5289,14 @@
       </p:sp>
       <p:sp>
         <p:nvSpPr>
-          <p:cNvPr id="28" name="ZoneTexte 27"/>
+          <p:cNvPr id="18" name="ZoneTexte 17"/>
           <p:cNvSpPr txBox="1"/>
           <p:nvPr/>
         </p:nvSpPr>
         <p:spPr>
           <a:xfrm>
-            <a:off x="1817546" y="6216675"/>
-            <a:ext cx="2443903" cy="369332"/>
+            <a:off x="4989071" y="4707668"/>
+            <a:ext cx="2055627" cy="923330"/>
           </a:xfrm>
           <a:prstGeom prst="rect">
             <a:avLst/>
@@ -4701,26 +5309,62 @@
           </a:bodyPr>
           <a:lstStyle/>
           <a:p>
-            <a:r>
-              <a:rPr lang="fr-FR" dirty="0" err="1" smtClean="0"/>
-              <a:t>controllerBackend</a:t>
-            </a:r>
-            <a:endParaRPr lang="fr-FR" dirty="0"/>
-          </a:p>
-        </p:txBody>
-      </p:sp>
-      <p:sp>
-        <p:nvSpPr>
-          <p:cNvPr id="29" name="Flèche vers le bas 28"/>
+            <a:pPr algn="ctr"/>
+            <a:r>
+              <a:rPr lang="fr-FR" dirty="0" smtClean="0">
+                <a:solidFill>
+                  <a:schemeClr val="bg1"/>
+                </a:solidFill>
+              </a:rPr>
+              <a:t>Modèle</a:t>
+            </a:r>
+          </a:p>
+          <a:p>
+            <a:pPr algn="ctr"/>
+            <a:r>
+              <a:rPr lang="fr-FR" dirty="0" smtClean="0">
+                <a:solidFill>
+                  <a:schemeClr val="bg1"/>
+                </a:solidFill>
+              </a:rPr>
+              <a:t>(</a:t>
+            </a:r>
+            <a:r>
+              <a:rPr lang="fr-FR" dirty="0" err="1" smtClean="0">
+                <a:solidFill>
+                  <a:schemeClr val="bg1"/>
+                </a:solidFill>
+              </a:rPr>
+              <a:t>repository,interfaces</a:t>
+            </a:r>
+            <a:r>
+              <a:rPr lang="fr-FR" dirty="0" smtClean="0">
+                <a:solidFill>
+                  <a:schemeClr val="bg1"/>
+                </a:solidFill>
+              </a:rPr>
+              <a:t>)</a:t>
+            </a:r>
+            <a:endParaRPr lang="fr-FR" dirty="0">
+              <a:solidFill>
+                <a:schemeClr val="bg1"/>
+              </a:solidFill>
+            </a:endParaRPr>
+          </a:p>
+        </p:txBody>
+      </p:sp>
+      <p:sp>
+        <p:nvSpPr>
+          <p:cNvPr id="19" name="Rectangle à coins arrondis 18"/>
           <p:cNvSpPr/>
           <p:nvPr/>
         </p:nvSpPr>
         <p:spPr>
           <a:xfrm>
-            <a:off x="8675298" y="3312711"/>
-            <a:ext cx="370936" cy="1468536"/>
-          </a:xfrm>
-          <a:prstGeom prst="downArrow">
+            <a:off x="8470148" y="4496510"/>
+            <a:ext cx="2806994" cy="581247"/>
+          </a:xfrm>
+          <a:prstGeom prst="roundRect">
             <a:avLst/>
           </a:prstGeom>
         </p:spPr>
@@ -4751,6 +5395,908 @@
       </p:sp>
       <p:sp>
         <p:nvSpPr>
+          <p:cNvPr id="20" name="ZoneTexte 19"/>
+          <p:cNvSpPr txBox="1"/>
+          <p:nvPr/>
+        </p:nvSpPr>
+        <p:spPr>
+          <a:xfrm>
+            <a:off x="9025383" y="4602467"/>
+            <a:ext cx="2055627" cy="369332"/>
+          </a:xfrm>
+          <a:prstGeom prst="rect">
+            <a:avLst/>
+          </a:prstGeom>
+          <a:noFill/>
+        </p:spPr>
+        <p:txBody>
+          <a:bodyPr wrap="square" rtlCol="0">
+            <a:spAutoFit/>
+          </a:bodyPr>
+          <a:lstStyle/>
+          <a:p>
+            <a:r>
+              <a:rPr lang="fr-FR" dirty="0" smtClean="0">
+                <a:solidFill>
+                  <a:schemeClr val="bg1"/>
+                </a:solidFill>
+              </a:rPr>
+              <a:t>Base de donnée</a:t>
+            </a:r>
+            <a:endParaRPr lang="fr-FR" dirty="0">
+              <a:solidFill>
+                <a:schemeClr val="bg1"/>
+              </a:solidFill>
+            </a:endParaRPr>
+          </a:p>
+        </p:txBody>
+      </p:sp>
+      <p:sp>
+        <p:nvSpPr>
+          <p:cNvPr id="21" name="Rectangle à coins arrondis 20"/>
+          <p:cNvSpPr/>
+          <p:nvPr/>
+        </p:nvSpPr>
+        <p:spPr>
+          <a:xfrm>
+            <a:off x="961900" y="4236550"/>
+            <a:ext cx="2806994" cy="581247"/>
+          </a:xfrm>
+          <a:prstGeom prst="roundRect">
+            <a:avLst/>
+          </a:prstGeom>
+        </p:spPr>
+        <p:style>
+          <a:lnRef idx="2">
+            <a:schemeClr val="accent1">
+              <a:shade val="50000"/>
+            </a:schemeClr>
+          </a:lnRef>
+          <a:fillRef idx="1">
+            <a:schemeClr val="accent1"/>
+          </a:fillRef>
+          <a:effectRef idx="0">
+            <a:schemeClr val="accent1"/>
+          </a:effectRef>
+          <a:fontRef idx="minor">
+            <a:schemeClr val="lt1"/>
+          </a:fontRef>
+        </p:style>
+        <p:txBody>
+          <a:bodyPr rtlCol="0" anchor="ctr"/>
+          <a:lstStyle/>
+          <a:p>
+            <a:pPr algn="ctr"/>
+            <a:endParaRPr lang="fr-FR"/>
+          </a:p>
+        </p:txBody>
+      </p:sp>
+      <p:sp>
+        <p:nvSpPr>
+          <p:cNvPr id="22" name="ZoneTexte 21"/>
+          <p:cNvSpPr txBox="1"/>
+          <p:nvPr/>
+        </p:nvSpPr>
+        <p:spPr>
+          <a:xfrm>
+            <a:off x="932970" y="4204007"/>
+            <a:ext cx="2750286" cy="646331"/>
+          </a:xfrm>
+          <a:prstGeom prst="rect">
+            <a:avLst/>
+          </a:prstGeom>
+          <a:noFill/>
+        </p:spPr>
+        <p:txBody>
+          <a:bodyPr wrap="square" rtlCol="0">
+            <a:spAutoFit/>
+          </a:bodyPr>
+          <a:lstStyle/>
+          <a:p>
+            <a:pPr algn="ctr"/>
+            <a:r>
+              <a:rPr lang="fr-FR" dirty="0" smtClean="0">
+                <a:solidFill>
+                  <a:schemeClr val="bg1"/>
+                </a:solidFill>
+              </a:rPr>
+              <a:t>Vue</a:t>
+            </a:r>
+          </a:p>
+          <a:p>
+            <a:pPr algn="ctr"/>
+            <a:r>
+              <a:rPr lang="fr-FR" dirty="0" smtClean="0">
+                <a:solidFill>
+                  <a:schemeClr val="bg1"/>
+                </a:solidFill>
+              </a:rPr>
+              <a:t>(</a:t>
+            </a:r>
+            <a:r>
+              <a:rPr lang="fr-FR" dirty="0" err="1" smtClean="0">
+                <a:solidFill>
+                  <a:schemeClr val="bg1"/>
+                </a:solidFill>
+              </a:rPr>
+              <a:t>frontend,backend</a:t>
+            </a:r>
+            <a:r>
+              <a:rPr lang="fr-FR" dirty="0" smtClean="0">
+                <a:solidFill>
+                  <a:schemeClr val="bg1"/>
+                </a:solidFill>
+              </a:rPr>
+              <a:t>)</a:t>
+            </a:r>
+            <a:endParaRPr lang="fr-FR" dirty="0">
+              <a:solidFill>
+                <a:schemeClr val="bg1"/>
+              </a:solidFill>
+            </a:endParaRPr>
+          </a:p>
+        </p:txBody>
+      </p:sp>
+      <p:sp>
+        <p:nvSpPr>
+          <p:cNvPr id="27" name="Double flèche verticale 26"/>
+          <p:cNvSpPr/>
+          <p:nvPr/>
+        </p:nvSpPr>
+        <p:spPr>
+          <a:xfrm>
+            <a:off x="5788111" y="1835896"/>
+            <a:ext cx="228774" cy="521489"/>
+          </a:xfrm>
+          <a:prstGeom prst="upDownArrow">
+            <a:avLst/>
+          </a:prstGeom>
+        </p:spPr>
+        <p:style>
+          <a:lnRef idx="2">
+            <a:schemeClr val="accent1">
+              <a:shade val="50000"/>
+            </a:schemeClr>
+          </a:lnRef>
+          <a:fillRef idx="1">
+            <a:schemeClr val="accent1"/>
+          </a:fillRef>
+          <a:effectRef idx="0">
+            <a:schemeClr val="accent1"/>
+          </a:effectRef>
+          <a:fontRef idx="minor">
+            <a:schemeClr val="lt1"/>
+          </a:fontRef>
+        </p:style>
+        <p:txBody>
+          <a:bodyPr rtlCol="0" anchor="ctr"/>
+          <a:lstStyle/>
+          <a:p>
+            <a:pPr algn="ctr"/>
+            <a:endParaRPr lang="fr-FR"/>
+          </a:p>
+        </p:txBody>
+      </p:sp>
+      <p:sp>
+        <p:nvSpPr>
+          <p:cNvPr id="28" name="Double flèche verticale 27"/>
+          <p:cNvSpPr/>
+          <p:nvPr/>
+        </p:nvSpPr>
+        <p:spPr>
+          <a:xfrm rot="5400000">
+            <a:off x="3754708" y="2277835"/>
+            <a:ext cx="228774" cy="521489"/>
+          </a:xfrm>
+          <a:prstGeom prst="upDownArrow">
+            <a:avLst/>
+          </a:prstGeom>
+        </p:spPr>
+        <p:style>
+          <a:lnRef idx="2">
+            <a:schemeClr val="accent1">
+              <a:shade val="50000"/>
+            </a:schemeClr>
+          </a:lnRef>
+          <a:fillRef idx="1">
+            <a:schemeClr val="accent1"/>
+          </a:fillRef>
+          <a:effectRef idx="0">
+            <a:schemeClr val="accent1"/>
+          </a:effectRef>
+          <a:fontRef idx="minor">
+            <a:schemeClr val="lt1"/>
+          </a:fontRef>
+        </p:style>
+        <p:txBody>
+          <a:bodyPr rtlCol="0" anchor="ctr"/>
+          <a:lstStyle/>
+          <a:p>
+            <a:pPr algn="ctr"/>
+            <a:endParaRPr lang="fr-FR"/>
+          </a:p>
+        </p:txBody>
+      </p:sp>
+      <p:sp>
+        <p:nvSpPr>
+          <p:cNvPr id="29" name="Double flèche verticale 28"/>
+          <p:cNvSpPr/>
+          <p:nvPr/>
+        </p:nvSpPr>
+        <p:spPr>
+          <a:xfrm rot="5400000">
+            <a:off x="7731609" y="2298940"/>
+            <a:ext cx="228774" cy="521489"/>
+          </a:xfrm>
+          <a:prstGeom prst="upDownArrow">
+            <a:avLst/>
+          </a:prstGeom>
+        </p:spPr>
+        <p:style>
+          <a:lnRef idx="2">
+            <a:schemeClr val="accent1">
+              <a:shade val="50000"/>
+            </a:schemeClr>
+          </a:lnRef>
+          <a:fillRef idx="1">
+            <a:schemeClr val="accent1"/>
+          </a:fillRef>
+          <a:effectRef idx="0">
+            <a:schemeClr val="accent1"/>
+          </a:effectRef>
+          <a:fontRef idx="minor">
+            <a:schemeClr val="lt1"/>
+          </a:fontRef>
+        </p:style>
+        <p:txBody>
+          <a:bodyPr rtlCol="0" anchor="ctr"/>
+          <a:lstStyle/>
+          <a:p>
+            <a:pPr algn="ctr"/>
+            <a:endParaRPr lang="fr-FR"/>
+          </a:p>
+        </p:txBody>
+      </p:sp>
+      <p:sp>
+        <p:nvSpPr>
+          <p:cNvPr id="30" name="Double flèche verticale 29"/>
+          <p:cNvSpPr/>
+          <p:nvPr/>
+        </p:nvSpPr>
+        <p:spPr>
+          <a:xfrm rot="2731536">
+            <a:off x="3939450" y="3098711"/>
+            <a:ext cx="228774" cy="814061"/>
+          </a:xfrm>
+          <a:prstGeom prst="upDownArrow">
+            <a:avLst/>
+          </a:prstGeom>
+        </p:spPr>
+        <p:style>
+          <a:lnRef idx="2">
+            <a:schemeClr val="accent1">
+              <a:shade val="50000"/>
+            </a:schemeClr>
+          </a:lnRef>
+          <a:fillRef idx="1">
+            <a:schemeClr val="accent1"/>
+          </a:fillRef>
+          <a:effectRef idx="0">
+            <a:schemeClr val="accent1"/>
+          </a:effectRef>
+          <a:fontRef idx="minor">
+            <a:schemeClr val="lt1"/>
+          </a:fontRef>
+        </p:style>
+        <p:txBody>
+          <a:bodyPr rtlCol="0" anchor="ctr"/>
+          <a:lstStyle/>
+          <a:p>
+            <a:pPr algn="ctr"/>
+            <a:endParaRPr lang="fr-FR"/>
+          </a:p>
+        </p:txBody>
+      </p:sp>
+      <p:sp>
+        <p:nvSpPr>
+          <p:cNvPr id="31" name="Double flèche verticale 30"/>
+          <p:cNvSpPr/>
+          <p:nvPr/>
+        </p:nvSpPr>
+        <p:spPr>
+          <a:xfrm>
+            <a:off x="5872434" y="3772658"/>
+            <a:ext cx="228774" cy="634763"/>
+          </a:xfrm>
+          <a:prstGeom prst="upDownArrow">
+            <a:avLst/>
+          </a:prstGeom>
+        </p:spPr>
+        <p:style>
+          <a:lnRef idx="2">
+            <a:schemeClr val="accent1">
+              <a:shade val="50000"/>
+            </a:schemeClr>
+          </a:lnRef>
+          <a:fillRef idx="1">
+            <a:schemeClr val="accent1"/>
+          </a:fillRef>
+          <a:effectRef idx="0">
+            <a:schemeClr val="accent1"/>
+          </a:effectRef>
+          <a:fontRef idx="minor">
+            <a:schemeClr val="lt1"/>
+          </a:fontRef>
+        </p:style>
+        <p:txBody>
+          <a:bodyPr rtlCol="0" anchor="ctr"/>
+          <a:lstStyle/>
+          <a:p>
+            <a:pPr algn="ctr"/>
+            <a:endParaRPr lang="fr-FR"/>
+          </a:p>
+        </p:txBody>
+      </p:sp>
+      <p:sp>
+        <p:nvSpPr>
+          <p:cNvPr id="32" name="Double flèche verticale 31"/>
+          <p:cNvSpPr/>
+          <p:nvPr/>
+        </p:nvSpPr>
+        <p:spPr>
+          <a:xfrm rot="5400000">
+            <a:off x="7830877" y="4526389"/>
+            <a:ext cx="228774" cy="521489"/>
+          </a:xfrm>
+          <a:prstGeom prst="upDownArrow">
+            <a:avLst/>
+          </a:prstGeom>
+        </p:spPr>
+        <p:style>
+          <a:lnRef idx="2">
+            <a:schemeClr val="accent1">
+              <a:shade val="50000"/>
+            </a:schemeClr>
+          </a:lnRef>
+          <a:fillRef idx="1">
+            <a:schemeClr val="accent1"/>
+          </a:fillRef>
+          <a:effectRef idx="0">
+            <a:schemeClr val="accent1"/>
+          </a:effectRef>
+          <a:fontRef idx="minor">
+            <a:schemeClr val="lt1"/>
+          </a:fontRef>
+        </p:style>
+        <p:txBody>
+          <a:bodyPr rtlCol="0" anchor="ctr"/>
+          <a:lstStyle/>
+          <a:p>
+            <a:pPr algn="ctr"/>
+            <a:endParaRPr lang="fr-FR"/>
+          </a:p>
+        </p:txBody>
+      </p:sp>
+    </p:spTree>
+    <p:extLst>
+      <p:ext uri="{BB962C8B-B14F-4D97-AF65-F5344CB8AC3E}">
+        <p14:creationId xmlns:p14="http://schemas.microsoft.com/office/powerpoint/2010/main" val="2944672175"/>
+      </p:ext>
+    </p:extLst>
+  </p:cSld>
+  <p:clrMapOvr>
+    <a:masterClrMapping/>
+  </p:clrMapOvr>
+</p:sld>
+</file>
+
+<file path=ppt/slides/slide14.xml><?xml version="1.0" encoding="utf-8"?>
+<p:sld xmlns:a="http://schemas.openxmlformats.org/drawingml/2006/main" xmlns:r="http://schemas.openxmlformats.org/officeDocument/2006/relationships" xmlns:p="http://schemas.openxmlformats.org/presentationml/2006/main">
+  <p:cSld>
+    <p:spTree>
+      <p:nvGrpSpPr>
+        <p:cNvPr id="1" name=""/>
+        <p:cNvGrpSpPr/>
+        <p:nvPr/>
+      </p:nvGrpSpPr>
+      <p:grpSpPr>
+        <a:xfrm>
+          <a:off x="0" y="0"/>
+          <a:ext cx="0" cy="0"/>
+          <a:chOff x="0" y="0"/>
+          <a:chExt cx="0" cy="0"/>
+        </a:xfrm>
+      </p:grpSpPr>
+      <p:sp>
+        <p:nvSpPr>
+          <p:cNvPr id="4" name="Rectangle 3"/>
+          <p:cNvSpPr/>
+          <p:nvPr/>
+        </p:nvSpPr>
+        <p:spPr>
+          <a:xfrm>
+            <a:off x="2162603" y="267420"/>
+            <a:ext cx="8249479" cy="707886"/>
+          </a:xfrm>
+          <a:prstGeom prst="rect">
+            <a:avLst/>
+          </a:prstGeom>
+        </p:spPr>
+        <p:txBody>
+          <a:bodyPr wrap="square">
+            <a:spAutoFit/>
+          </a:bodyPr>
+          <a:lstStyle/>
+          <a:p>
+            <a:r>
+              <a:rPr lang="fr-FR" sz="4000" dirty="0"/>
+              <a:t>Programmation orientée objet</a:t>
+            </a:r>
+          </a:p>
+        </p:txBody>
+      </p:sp>
+      <p:sp>
+        <p:nvSpPr>
+          <p:cNvPr id="8" name="Légende encadrée 2 7"/>
+          <p:cNvSpPr/>
+          <p:nvPr/>
+        </p:nvSpPr>
+        <p:spPr>
+          <a:xfrm rot="10800000">
+            <a:off x="1630392" y="1500996"/>
+            <a:ext cx="2631057" cy="1604513"/>
+          </a:xfrm>
+          <a:prstGeom prst="borderCallout2">
+            <a:avLst>
+              <a:gd name="adj1" fmla="val 19288"/>
+              <a:gd name="adj2" fmla="val -464"/>
+              <a:gd name="adj3" fmla="val 18750"/>
+              <a:gd name="adj4" fmla="val -16667"/>
+              <a:gd name="adj5" fmla="val 112500"/>
+              <a:gd name="adj6" fmla="val -46667"/>
+            </a:avLst>
+          </a:prstGeom>
+        </p:spPr>
+        <p:style>
+          <a:lnRef idx="2">
+            <a:schemeClr val="accent1">
+              <a:shade val="50000"/>
+            </a:schemeClr>
+          </a:lnRef>
+          <a:fillRef idx="1">
+            <a:schemeClr val="accent1"/>
+          </a:fillRef>
+          <a:effectRef idx="0">
+            <a:schemeClr val="accent1"/>
+          </a:effectRef>
+          <a:fontRef idx="minor">
+            <a:schemeClr val="lt1"/>
+          </a:fontRef>
+        </p:style>
+        <p:txBody>
+          <a:bodyPr rtlCol="0" anchor="ctr"/>
+          <a:lstStyle/>
+          <a:p>
+            <a:pPr algn="ctr"/>
+            <a:endParaRPr lang="fr-FR"/>
+          </a:p>
+        </p:txBody>
+      </p:sp>
+      <p:sp>
+        <p:nvSpPr>
+          <p:cNvPr id="9" name="Légende encadrée 2 8"/>
+          <p:cNvSpPr/>
+          <p:nvPr/>
+        </p:nvSpPr>
+        <p:spPr>
+          <a:xfrm rot="10800000">
+            <a:off x="7545238" y="1411856"/>
+            <a:ext cx="2631057" cy="1604513"/>
+          </a:xfrm>
+          <a:prstGeom prst="borderCallout2">
+            <a:avLst>
+              <a:gd name="adj1" fmla="val 13374"/>
+              <a:gd name="adj2" fmla="val 100192"/>
+              <a:gd name="adj3" fmla="val 16599"/>
+              <a:gd name="adj4" fmla="val 118743"/>
+              <a:gd name="adj5" fmla="val 106586"/>
+              <a:gd name="adj6" fmla="val 150382"/>
+            </a:avLst>
+          </a:prstGeom>
+        </p:spPr>
+        <p:style>
+          <a:lnRef idx="2">
+            <a:schemeClr val="accent1">
+              <a:shade val="50000"/>
+            </a:schemeClr>
+          </a:lnRef>
+          <a:fillRef idx="1">
+            <a:schemeClr val="accent1"/>
+          </a:fillRef>
+          <a:effectRef idx="0">
+            <a:schemeClr val="accent1"/>
+          </a:effectRef>
+          <a:fontRef idx="minor">
+            <a:schemeClr val="lt1"/>
+          </a:fontRef>
+        </p:style>
+        <p:txBody>
+          <a:bodyPr rtlCol="0" anchor="ctr"/>
+          <a:lstStyle/>
+          <a:p>
+            <a:pPr algn="ctr"/>
+            <a:endParaRPr lang="fr-FR"/>
+          </a:p>
+        </p:txBody>
+      </p:sp>
+      <p:sp>
+        <p:nvSpPr>
+          <p:cNvPr id="10" name="ZoneTexte 9"/>
+          <p:cNvSpPr txBox="1"/>
+          <p:nvPr/>
+        </p:nvSpPr>
+        <p:spPr>
+          <a:xfrm>
+            <a:off x="8440946" y="2029446"/>
+            <a:ext cx="1587260" cy="369332"/>
+          </a:xfrm>
+          <a:prstGeom prst="rect">
+            <a:avLst/>
+          </a:prstGeom>
+          <a:noFill/>
+        </p:spPr>
+        <p:txBody>
+          <a:bodyPr wrap="square" rtlCol="0">
+            <a:spAutoFit/>
+          </a:bodyPr>
+          <a:lstStyle/>
+          <a:p>
+            <a:r>
+              <a:rPr lang="fr-FR" dirty="0" smtClean="0"/>
+              <a:t>Model</a:t>
+            </a:r>
+            <a:endParaRPr lang="fr-FR" dirty="0"/>
+          </a:p>
+        </p:txBody>
+      </p:sp>
+      <p:sp>
+        <p:nvSpPr>
+          <p:cNvPr id="13" name="ZoneTexte 12"/>
+          <p:cNvSpPr txBox="1"/>
+          <p:nvPr/>
+        </p:nvSpPr>
+        <p:spPr>
+          <a:xfrm>
+            <a:off x="2300378" y="2074125"/>
+            <a:ext cx="1846053" cy="369332"/>
+          </a:xfrm>
+          <a:prstGeom prst="rect">
+            <a:avLst/>
+          </a:prstGeom>
+          <a:noFill/>
+        </p:spPr>
+        <p:txBody>
+          <a:bodyPr wrap="square" rtlCol="0">
+            <a:spAutoFit/>
+          </a:bodyPr>
+          <a:lstStyle/>
+          <a:p>
+            <a:r>
+              <a:rPr lang="fr-FR" dirty="0" smtClean="0">
+                <a:solidFill>
+                  <a:schemeClr val="bg1"/>
+                </a:solidFill>
+              </a:rPr>
+              <a:t>Controller</a:t>
+            </a:r>
+            <a:endParaRPr lang="fr-FR" dirty="0">
+              <a:solidFill>
+                <a:schemeClr val="bg1"/>
+              </a:solidFill>
+            </a:endParaRPr>
+          </a:p>
+        </p:txBody>
+      </p:sp>
+      <p:sp>
+        <p:nvSpPr>
+          <p:cNvPr id="16" name="Rectangle 15"/>
+          <p:cNvSpPr/>
+          <p:nvPr/>
+        </p:nvSpPr>
+        <p:spPr>
+          <a:xfrm>
+            <a:off x="2040145" y="3711539"/>
+            <a:ext cx="1858993" cy="1202644"/>
+          </a:xfrm>
+          <a:prstGeom prst="rect">
+            <a:avLst/>
+          </a:prstGeom>
+        </p:spPr>
+        <p:style>
+          <a:lnRef idx="2">
+            <a:schemeClr val="accent1">
+              <a:shade val="50000"/>
+            </a:schemeClr>
+          </a:lnRef>
+          <a:fillRef idx="1">
+            <a:schemeClr val="accent1"/>
+          </a:fillRef>
+          <a:effectRef idx="0">
+            <a:schemeClr val="accent1"/>
+          </a:effectRef>
+          <a:fontRef idx="minor">
+            <a:schemeClr val="lt1"/>
+          </a:fontRef>
+        </p:style>
+        <p:txBody>
+          <a:bodyPr rtlCol="0" anchor="ctr"/>
+          <a:lstStyle/>
+          <a:p>
+            <a:pPr algn="ctr"/>
+            <a:endParaRPr lang="fr-FR"/>
+          </a:p>
+        </p:txBody>
+      </p:sp>
+      <p:sp>
+        <p:nvSpPr>
+          <p:cNvPr id="17" name="ZoneTexte 16"/>
+          <p:cNvSpPr txBox="1"/>
+          <p:nvPr/>
+        </p:nvSpPr>
+        <p:spPr>
+          <a:xfrm>
+            <a:off x="2585049" y="4046979"/>
+            <a:ext cx="2165231" cy="369332"/>
+          </a:xfrm>
+          <a:prstGeom prst="rect">
+            <a:avLst/>
+          </a:prstGeom>
+          <a:noFill/>
+        </p:spPr>
+        <p:txBody>
+          <a:bodyPr wrap="square" rtlCol="0">
+            <a:spAutoFit/>
+          </a:bodyPr>
+          <a:lstStyle/>
+          <a:p>
+            <a:r>
+              <a:rPr lang="fr-FR" dirty="0" smtClean="0">
+                <a:solidFill>
+                  <a:schemeClr val="bg1"/>
+                </a:solidFill>
+              </a:rPr>
+              <a:t>Class</a:t>
+            </a:r>
+            <a:endParaRPr lang="fr-FR" dirty="0">
+              <a:solidFill>
+                <a:schemeClr val="bg1"/>
+              </a:solidFill>
+            </a:endParaRPr>
+          </a:p>
+        </p:txBody>
+      </p:sp>
+      <p:sp>
+        <p:nvSpPr>
+          <p:cNvPr id="24" name="Flèche vers le bas 23"/>
+          <p:cNvSpPr/>
+          <p:nvPr/>
+        </p:nvSpPr>
+        <p:spPr>
+          <a:xfrm>
+            <a:off x="2760452" y="5018405"/>
+            <a:ext cx="370936" cy="584935"/>
+          </a:xfrm>
+          <a:prstGeom prst="downArrow">
+            <a:avLst/>
+          </a:prstGeom>
+        </p:spPr>
+        <p:style>
+          <a:lnRef idx="2">
+            <a:schemeClr val="accent1">
+              <a:shade val="50000"/>
+            </a:schemeClr>
+          </a:lnRef>
+          <a:fillRef idx="1">
+            <a:schemeClr val="accent1"/>
+          </a:fillRef>
+          <a:effectRef idx="0">
+            <a:schemeClr val="accent1"/>
+          </a:effectRef>
+          <a:fontRef idx="minor">
+            <a:schemeClr val="lt1"/>
+          </a:fontRef>
+        </p:style>
+        <p:txBody>
+          <a:bodyPr rtlCol="0" anchor="ctr"/>
+          <a:lstStyle/>
+          <a:p>
+            <a:pPr algn="ctr"/>
+            <a:endParaRPr lang="fr-FR"/>
+          </a:p>
+        </p:txBody>
+      </p:sp>
+      <p:sp>
+        <p:nvSpPr>
+          <p:cNvPr id="25" name="ZoneTexte 24"/>
+          <p:cNvSpPr txBox="1"/>
+          <p:nvPr/>
+        </p:nvSpPr>
+        <p:spPr>
+          <a:xfrm>
+            <a:off x="1817546" y="5707563"/>
+            <a:ext cx="2443903" cy="369332"/>
+          </a:xfrm>
+          <a:prstGeom prst="rect">
+            <a:avLst/>
+          </a:prstGeom>
+          <a:noFill/>
+        </p:spPr>
+        <p:txBody>
+          <a:bodyPr wrap="square" rtlCol="0">
+            <a:spAutoFit/>
+          </a:bodyPr>
+          <a:lstStyle/>
+          <a:p>
+            <a:r>
+              <a:rPr lang="fr-FR" dirty="0" err="1" smtClean="0"/>
+              <a:t>controllerFrontend</a:t>
+            </a:r>
+            <a:endParaRPr lang="fr-FR" dirty="0"/>
+          </a:p>
+        </p:txBody>
+      </p:sp>
+      <p:sp>
+        <p:nvSpPr>
+          <p:cNvPr id="26" name="Flèche vers le bas 25"/>
+          <p:cNvSpPr/>
+          <p:nvPr/>
+        </p:nvSpPr>
+        <p:spPr>
+          <a:xfrm>
+            <a:off x="2784174" y="3158952"/>
+            <a:ext cx="284673" cy="455670"/>
+          </a:xfrm>
+          <a:prstGeom prst="downArrow">
+            <a:avLst/>
+          </a:prstGeom>
+        </p:spPr>
+        <p:style>
+          <a:lnRef idx="2">
+            <a:schemeClr val="accent1">
+              <a:shade val="50000"/>
+            </a:schemeClr>
+          </a:lnRef>
+          <a:fillRef idx="1">
+            <a:schemeClr val="accent1"/>
+          </a:fillRef>
+          <a:effectRef idx="0">
+            <a:schemeClr val="accent1"/>
+          </a:effectRef>
+          <a:fontRef idx="minor">
+            <a:schemeClr val="lt1"/>
+          </a:fontRef>
+        </p:style>
+        <p:txBody>
+          <a:bodyPr rtlCol="0" anchor="ctr"/>
+          <a:lstStyle/>
+          <a:p>
+            <a:pPr algn="ctr"/>
+            <a:endParaRPr lang="fr-FR"/>
+          </a:p>
+        </p:txBody>
+      </p:sp>
+      <p:sp>
+        <p:nvSpPr>
+          <p:cNvPr id="27" name="Flèche vers le bas 26"/>
+          <p:cNvSpPr/>
+          <p:nvPr/>
+        </p:nvSpPr>
+        <p:spPr>
+          <a:xfrm rot="16200000">
+            <a:off x="5713980" y="5364581"/>
+            <a:ext cx="370936" cy="1468536"/>
+          </a:xfrm>
+          <a:prstGeom prst="downArrow">
+            <a:avLst/>
+          </a:prstGeom>
+        </p:spPr>
+        <p:style>
+          <a:lnRef idx="2">
+            <a:schemeClr val="accent1">
+              <a:shade val="50000"/>
+            </a:schemeClr>
+          </a:lnRef>
+          <a:fillRef idx="1">
+            <a:schemeClr val="accent1"/>
+          </a:fillRef>
+          <a:effectRef idx="0">
+            <a:schemeClr val="accent1"/>
+          </a:effectRef>
+          <a:fontRef idx="minor">
+            <a:schemeClr val="lt1"/>
+          </a:fontRef>
+        </p:style>
+        <p:txBody>
+          <a:bodyPr rtlCol="0" anchor="ctr"/>
+          <a:lstStyle/>
+          <a:p>
+            <a:pPr algn="ctr"/>
+            <a:endParaRPr lang="fr-FR"/>
+          </a:p>
+        </p:txBody>
+      </p:sp>
+      <p:sp>
+        <p:nvSpPr>
+          <p:cNvPr id="28" name="ZoneTexte 27"/>
+          <p:cNvSpPr txBox="1"/>
+          <p:nvPr/>
+        </p:nvSpPr>
+        <p:spPr>
+          <a:xfrm>
+            <a:off x="1817546" y="6216675"/>
+            <a:ext cx="2443903" cy="369332"/>
+          </a:xfrm>
+          <a:prstGeom prst="rect">
+            <a:avLst/>
+          </a:prstGeom>
+          <a:noFill/>
+        </p:spPr>
+        <p:txBody>
+          <a:bodyPr wrap="square" rtlCol="0">
+            <a:spAutoFit/>
+          </a:bodyPr>
+          <a:lstStyle/>
+          <a:p>
+            <a:r>
+              <a:rPr lang="fr-FR" dirty="0" err="1" smtClean="0"/>
+              <a:t>controllerBackend</a:t>
+            </a:r>
+            <a:endParaRPr lang="fr-FR" dirty="0"/>
+          </a:p>
+        </p:txBody>
+      </p:sp>
+      <p:sp>
+        <p:nvSpPr>
+          <p:cNvPr id="29" name="Flèche vers le bas 28"/>
+          <p:cNvSpPr/>
+          <p:nvPr/>
+        </p:nvSpPr>
+        <p:spPr>
+          <a:xfrm>
+            <a:off x="8675298" y="3312711"/>
+            <a:ext cx="370936" cy="1468536"/>
+          </a:xfrm>
+          <a:prstGeom prst="downArrow">
+            <a:avLst/>
+          </a:prstGeom>
+        </p:spPr>
+        <p:style>
+          <a:lnRef idx="2">
+            <a:schemeClr val="accent1">
+              <a:shade val="50000"/>
+            </a:schemeClr>
+          </a:lnRef>
+          <a:fillRef idx="1">
+            <a:schemeClr val="accent1"/>
+          </a:fillRef>
+          <a:effectRef idx="0">
+            <a:schemeClr val="accent1"/>
+          </a:effectRef>
+          <a:fontRef idx="minor">
+            <a:schemeClr val="lt1"/>
+          </a:fontRef>
+        </p:style>
+        <p:txBody>
+          <a:bodyPr rtlCol="0" anchor="ctr"/>
+          <a:lstStyle/>
+          <a:p>
+            <a:pPr algn="ctr"/>
+            <a:endParaRPr lang="fr-FR"/>
+          </a:p>
+        </p:txBody>
+      </p:sp>
+      <p:sp>
+        <p:nvSpPr>
           <p:cNvPr id="30" name="ZoneTexte 29"/>
           <p:cNvSpPr txBox="1"/>
           <p:nvPr/>
@@ -4887,10 +6433,391 @@
   <p:clrMapOvr>
     <a:masterClrMapping/>
   </p:clrMapOvr>
+  <p:timing>
+    <p:tnLst>
+      <p:par>
+        <p:cTn id="1" dur="indefinite" restart="never" nodeType="tmRoot"/>
+      </p:par>
+    </p:tnLst>
+  </p:timing>
 </p:sld>
 </file>
 
-<file path=ppt/slides/slide14.xml><?xml version="1.0" encoding="utf-8"?>
+<file path=ppt/slides/slide15.xml><?xml version="1.0" encoding="utf-8"?>
+<p:sld xmlns:a="http://schemas.openxmlformats.org/drawingml/2006/main" xmlns:r="http://schemas.openxmlformats.org/officeDocument/2006/relationships" xmlns:p="http://schemas.openxmlformats.org/presentationml/2006/main">
+  <p:cSld>
+    <p:spTree>
+      <p:nvGrpSpPr>
+        <p:cNvPr id="1" name=""/>
+        <p:cNvGrpSpPr/>
+        <p:nvPr/>
+      </p:nvGrpSpPr>
+      <p:grpSpPr>
+        <a:xfrm>
+          <a:off x="0" y="0"/>
+          <a:ext cx="0" cy="0"/>
+          <a:chOff x="0" y="0"/>
+          <a:chExt cx="0" cy="0"/>
+        </a:xfrm>
+      </p:grpSpPr>
+      <p:sp>
+        <p:nvSpPr>
+          <p:cNvPr id="4" name="Rectangle 3"/>
+          <p:cNvSpPr/>
+          <p:nvPr/>
+        </p:nvSpPr>
+        <p:spPr>
+          <a:xfrm>
+            <a:off x="4253673" y="175271"/>
+            <a:ext cx="8249479" cy="707886"/>
+          </a:xfrm>
+          <a:prstGeom prst="rect">
+            <a:avLst/>
+          </a:prstGeom>
+        </p:spPr>
+        <p:txBody>
+          <a:bodyPr wrap="square">
+            <a:spAutoFit/>
+          </a:bodyPr>
+          <a:lstStyle/>
+          <a:p>
+            <a:r>
+              <a:rPr lang="fr-FR" sz="4000" dirty="0" smtClean="0"/>
+              <a:t>Sécurité</a:t>
+            </a:r>
+            <a:endParaRPr lang="fr-FR" sz="4000" dirty="0"/>
+          </a:p>
+        </p:txBody>
+      </p:sp>
+      <p:sp>
+        <p:nvSpPr>
+          <p:cNvPr id="5" name="ZoneTexte 4"/>
+          <p:cNvSpPr txBox="1"/>
+          <p:nvPr/>
+        </p:nvSpPr>
+        <p:spPr>
+          <a:xfrm>
+            <a:off x="1275907" y="1445679"/>
+            <a:ext cx="2374605" cy="369332"/>
+          </a:xfrm>
+          <a:prstGeom prst="rect">
+            <a:avLst/>
+          </a:prstGeom>
+          <a:noFill/>
+        </p:spPr>
+        <p:txBody>
+          <a:bodyPr wrap="square" rtlCol="0">
+            <a:spAutoFit/>
+          </a:bodyPr>
+          <a:lstStyle/>
+          <a:p>
+            <a:r>
+              <a:rPr lang="fr-FR" dirty="0" smtClean="0"/>
+              <a:t>.</a:t>
+            </a:r>
+            <a:r>
+              <a:rPr lang="fr-FR" dirty="0" err="1" smtClean="0"/>
+              <a:t>htaccess</a:t>
+            </a:r>
+            <a:endParaRPr lang="fr-FR" dirty="0"/>
+          </a:p>
+        </p:txBody>
+      </p:sp>
+      <p:pic>
+        <p:nvPicPr>
+          <p:cNvPr id="6" name="Image 5"/>
+          <p:cNvPicPr>
+            <a:picLocks noChangeAspect="1"/>
+          </p:cNvPicPr>
+          <p:nvPr/>
+        </p:nvPicPr>
+        <p:blipFill>
+          <a:blip r:embed="rId2">
+            <a:extLst>
+              <a:ext uri="{28A0092B-C50C-407E-A947-70E740481C1C}">
+                <a14:useLocalDpi xmlns:a14="http://schemas.microsoft.com/office/drawing/2010/main" val="0"/>
+              </a:ext>
+            </a:extLst>
+          </a:blip>
+          <a:stretch>
+            <a:fillRect/>
+          </a:stretch>
+        </p:blipFill>
+        <p:spPr>
+          <a:xfrm>
+            <a:off x="3650512" y="1123629"/>
+            <a:ext cx="7011008" cy="1265030"/>
+          </a:xfrm>
+          <a:prstGeom prst="rect">
+            <a:avLst/>
+          </a:prstGeom>
+        </p:spPr>
+      </p:pic>
+      <p:sp>
+        <p:nvSpPr>
+          <p:cNvPr id="7" name="Flèche droite 6"/>
+          <p:cNvSpPr/>
+          <p:nvPr/>
+        </p:nvSpPr>
+        <p:spPr>
+          <a:xfrm>
+            <a:off x="2573079" y="1538177"/>
+            <a:ext cx="850605" cy="361507"/>
+          </a:xfrm>
+          <a:prstGeom prst="rightArrow">
+            <a:avLst/>
+          </a:prstGeom>
+        </p:spPr>
+        <p:style>
+          <a:lnRef idx="2">
+            <a:schemeClr val="accent1">
+              <a:shade val="50000"/>
+            </a:schemeClr>
+          </a:lnRef>
+          <a:fillRef idx="1">
+            <a:schemeClr val="accent1"/>
+          </a:fillRef>
+          <a:effectRef idx="0">
+            <a:schemeClr val="accent1"/>
+          </a:effectRef>
+          <a:fontRef idx="minor">
+            <a:schemeClr val="lt1"/>
+          </a:fontRef>
+        </p:style>
+        <p:txBody>
+          <a:bodyPr rtlCol="0" anchor="ctr"/>
+          <a:lstStyle/>
+          <a:p>
+            <a:pPr algn="ctr"/>
+            <a:endParaRPr lang="fr-FR"/>
+          </a:p>
+        </p:txBody>
+      </p:sp>
+    </p:spTree>
+    <p:extLst>
+      <p:ext uri="{BB962C8B-B14F-4D97-AF65-F5344CB8AC3E}">
+        <p14:creationId xmlns:p14="http://schemas.microsoft.com/office/powerpoint/2010/main" val="2112676254"/>
+      </p:ext>
+    </p:extLst>
+  </p:cSld>
+  <p:clrMapOvr>
+    <a:masterClrMapping/>
+  </p:clrMapOvr>
+</p:sld>
+</file>
+
+<file path=ppt/slides/slide16.xml><?xml version="1.0" encoding="utf-8"?>
+<p:sld xmlns:a="http://schemas.openxmlformats.org/drawingml/2006/main" xmlns:r="http://schemas.openxmlformats.org/officeDocument/2006/relationships" xmlns:p="http://schemas.openxmlformats.org/presentationml/2006/main">
+  <p:cSld>
+    <p:spTree>
+      <p:nvGrpSpPr>
+        <p:cNvPr id="1" name=""/>
+        <p:cNvGrpSpPr/>
+        <p:nvPr/>
+      </p:nvGrpSpPr>
+      <p:grpSpPr>
+        <a:xfrm>
+          <a:off x="0" y="0"/>
+          <a:ext cx="0" cy="0"/>
+          <a:chOff x="0" y="0"/>
+          <a:chExt cx="0" cy="0"/>
+        </a:xfrm>
+      </p:grpSpPr>
+      <p:sp>
+        <p:nvSpPr>
+          <p:cNvPr id="5" name="Rectangle 4"/>
+          <p:cNvSpPr/>
+          <p:nvPr/>
+        </p:nvSpPr>
+        <p:spPr>
+          <a:xfrm>
+            <a:off x="3048000" y="3105835"/>
+            <a:ext cx="6096000" cy="646331"/>
+          </a:xfrm>
+          <a:prstGeom prst="rect">
+            <a:avLst/>
+          </a:prstGeom>
+        </p:spPr>
+        <p:txBody>
+          <a:bodyPr>
+            <a:spAutoFit/>
+          </a:bodyPr>
+          <a:lstStyle/>
+          <a:p>
+            <a:r>
+              <a:rPr lang="fr-FR" dirty="0"/>
+              <a:t/>
+            </a:r>
+            <a:br>
+              <a:rPr lang="fr-FR" dirty="0"/>
+            </a:br>
+            <a:endParaRPr lang="fr-FR" dirty="0"/>
+          </a:p>
+        </p:txBody>
+      </p:sp>
+      <p:sp>
+        <p:nvSpPr>
+          <p:cNvPr id="6" name="ZoneTexte 5"/>
+          <p:cNvSpPr txBox="1"/>
+          <p:nvPr/>
+        </p:nvSpPr>
+        <p:spPr>
+          <a:xfrm>
+            <a:off x="3586716" y="179189"/>
+            <a:ext cx="4245935" cy="461665"/>
+          </a:xfrm>
+          <a:prstGeom prst="rect">
+            <a:avLst/>
+          </a:prstGeom>
+          <a:noFill/>
+        </p:spPr>
+        <p:txBody>
+          <a:bodyPr wrap="square" rtlCol="0">
+            <a:spAutoFit/>
+          </a:bodyPr>
+          <a:lstStyle/>
+          <a:p>
+            <a:r>
+              <a:rPr lang="fr-FR" sz="2400" dirty="0" smtClean="0"/>
+              <a:t>Le rendu final du blog</a:t>
+            </a:r>
+            <a:endParaRPr lang="fr-FR" sz="2400" dirty="0"/>
+          </a:p>
+        </p:txBody>
+      </p:sp>
+      <p:pic>
+        <p:nvPicPr>
+          <p:cNvPr id="7" name="Image 6">
+            <a:hlinkClick r:id="rId2"/>
+          </p:cNvPr>
+          <p:cNvPicPr>
+            <a:picLocks noChangeAspect="1"/>
+          </p:cNvPicPr>
+          <p:nvPr/>
+        </p:nvPicPr>
+        <p:blipFill>
+          <a:blip r:embed="rId3">
+            <a:extLst>
+              <a:ext uri="{28A0092B-C50C-407E-A947-70E740481C1C}">
+                <a14:useLocalDpi xmlns:a14="http://schemas.microsoft.com/office/drawing/2010/main" val="0"/>
+              </a:ext>
+            </a:extLst>
+          </a:blip>
+          <a:stretch>
+            <a:fillRect/>
+          </a:stretch>
+        </p:blipFill>
+        <p:spPr>
+          <a:xfrm>
+            <a:off x="3034365" y="898195"/>
+            <a:ext cx="4372983" cy="4931989"/>
+          </a:xfrm>
+          <a:prstGeom prst="rect">
+            <a:avLst/>
+          </a:prstGeom>
+        </p:spPr>
+      </p:pic>
+      <p:pic>
+        <p:nvPicPr>
+          <p:cNvPr id="8" name="Image 7"/>
+          <p:cNvPicPr>
+            <a:picLocks noChangeAspect="1"/>
+          </p:cNvPicPr>
+          <p:nvPr/>
+        </p:nvPicPr>
+        <p:blipFill rotWithShape="1">
+          <a:blip r:embed="rId4">
+            <a:extLst>
+              <a:ext uri="{28A0092B-C50C-407E-A947-70E740481C1C}">
+                <a14:useLocalDpi xmlns:a14="http://schemas.microsoft.com/office/drawing/2010/main" val="0"/>
+              </a:ext>
+            </a:extLst>
+          </a:blip>
+          <a:srcRect t="24696"/>
+          <a:stretch/>
+        </p:blipFill>
+        <p:spPr>
+          <a:xfrm>
+            <a:off x="3034366" y="5830184"/>
+            <a:ext cx="4372983" cy="723072"/>
+          </a:xfrm>
+          <a:prstGeom prst="rect">
+            <a:avLst/>
+          </a:prstGeom>
+        </p:spPr>
+      </p:pic>
+    </p:spTree>
+    <p:extLst>
+      <p:ext uri="{BB962C8B-B14F-4D97-AF65-F5344CB8AC3E}">
+        <p14:creationId xmlns:p14="http://schemas.microsoft.com/office/powerpoint/2010/main" val="308424140"/>
+      </p:ext>
+    </p:extLst>
+  </p:cSld>
+  <p:clrMapOvr>
+    <a:masterClrMapping/>
+  </p:clrMapOvr>
+</p:sld>
+</file>
+
+<file path=ppt/slides/slide17.xml><?xml version="1.0" encoding="utf-8"?>
+<p:sld xmlns:a="http://schemas.openxmlformats.org/drawingml/2006/main" xmlns:r="http://schemas.openxmlformats.org/officeDocument/2006/relationships" xmlns:p="http://schemas.openxmlformats.org/presentationml/2006/main">
+  <p:cSld>
+    <p:spTree>
+      <p:nvGrpSpPr>
+        <p:cNvPr id="1" name=""/>
+        <p:cNvGrpSpPr/>
+        <p:nvPr/>
+      </p:nvGrpSpPr>
+      <p:grpSpPr>
+        <a:xfrm>
+          <a:off x="0" y="0"/>
+          <a:ext cx="0" cy="0"/>
+          <a:chOff x="0" y="0"/>
+          <a:chExt cx="0" cy="0"/>
+        </a:xfrm>
+      </p:grpSpPr>
+      <p:sp>
+        <p:nvSpPr>
+          <p:cNvPr id="4" name="Titre 3"/>
+          <p:cNvSpPr>
+            <a:spLocks noGrp="1"/>
+          </p:cNvSpPr>
+          <p:nvPr>
+            <p:ph type="ctrTitle"/>
+          </p:nvPr>
+        </p:nvSpPr>
+        <p:spPr>
+          <a:xfrm>
+            <a:off x="3239528" y="-190890"/>
+            <a:ext cx="9418320" cy="4041648"/>
+          </a:xfrm>
+        </p:spPr>
+        <p:txBody>
+          <a:bodyPr/>
+          <a:lstStyle/>
+          <a:p>
+            <a:r>
+              <a:rPr lang="fr-FR" b="1" i="1" dirty="0"/>
+              <a:t>Conclusion</a:t>
+            </a:r>
+            <a:endParaRPr lang="fr-FR" dirty="0"/>
+          </a:p>
+        </p:txBody>
+      </p:sp>
+    </p:spTree>
+    <p:extLst>
+      <p:ext uri="{BB962C8B-B14F-4D97-AF65-F5344CB8AC3E}">
+        <p14:creationId xmlns:p14="http://schemas.microsoft.com/office/powerpoint/2010/main" val="13638312"/>
+      </p:ext>
+    </p:extLst>
+  </p:cSld>
+  <p:clrMapOvr>
+    <a:masterClrMapping/>
+  </p:clrMapOvr>
+</p:sld>
+</file>
+
+<file path=ppt/slides/slide18.xml><?xml version="1.0" encoding="utf-8"?>
 <p:sld xmlns:a="http://schemas.openxmlformats.org/drawingml/2006/main" xmlns:r="http://schemas.openxmlformats.org/officeDocument/2006/relationships" xmlns:p="http://schemas.openxmlformats.org/presentationml/2006/main">
   <p:cSld>
     <p:spTree>
@@ -5533,6 +7460,95 @@
 </p:sld>
 </file>
 
+<file path=ppt/slides/slide19.xml><?xml version="1.0" encoding="utf-8"?>
+<p:sld xmlns:a="http://schemas.openxmlformats.org/drawingml/2006/main" xmlns:r="http://schemas.openxmlformats.org/officeDocument/2006/relationships" xmlns:p="http://schemas.openxmlformats.org/presentationml/2006/main">
+  <p:cSld>
+    <p:spTree>
+      <p:nvGrpSpPr>
+        <p:cNvPr id="1" name=""/>
+        <p:cNvGrpSpPr/>
+        <p:nvPr/>
+      </p:nvGrpSpPr>
+      <p:grpSpPr>
+        <a:xfrm>
+          <a:off x="0" y="0"/>
+          <a:ext cx="0" cy="0"/>
+          <a:chOff x="0" y="0"/>
+          <a:chExt cx="0" cy="0"/>
+        </a:xfrm>
+      </p:grpSpPr>
+      <p:sp>
+        <p:nvSpPr>
+          <p:cNvPr id="5" name="Rectangle 4"/>
+          <p:cNvSpPr/>
+          <p:nvPr/>
+        </p:nvSpPr>
+        <p:spPr>
+          <a:xfrm>
+            <a:off x="2921549" y="180598"/>
+            <a:ext cx="4615366" cy="646331"/>
+          </a:xfrm>
+          <a:prstGeom prst="rect">
+            <a:avLst/>
+          </a:prstGeom>
+        </p:spPr>
+        <p:txBody>
+          <a:bodyPr wrap="none">
+            <a:spAutoFit/>
+          </a:bodyPr>
+          <a:lstStyle/>
+          <a:p>
+            <a:pPr lvl="1"/>
+            <a:r>
+              <a:rPr lang="fr-FR" sz="3600" dirty="0" smtClean="0"/>
+              <a:t>Logiciel de version</a:t>
+            </a:r>
+            <a:endParaRPr lang="fr-FR" sz="3600" dirty="0"/>
+          </a:p>
+        </p:txBody>
+      </p:sp>
+      <p:pic>
+        <p:nvPicPr>
+          <p:cNvPr id="6" name="Image 5"/>
+          <p:cNvPicPr>
+            <a:picLocks noChangeAspect="1"/>
+          </p:cNvPicPr>
+          <p:nvPr/>
+        </p:nvPicPr>
+        <p:blipFill rotWithShape="1">
+          <a:blip r:embed="rId2">
+            <a:extLst>
+              <a:ext uri="{28A0092B-C50C-407E-A947-70E740481C1C}">
+                <a14:useLocalDpi xmlns:a14="http://schemas.microsoft.com/office/drawing/2010/main" val="0"/>
+              </a:ext>
+            </a:extLst>
+          </a:blip>
+          <a:srcRect l="6906" t="16266" r="7752" b="17302"/>
+          <a:stretch/>
+        </p:blipFill>
+        <p:spPr>
+          <a:xfrm>
+            <a:off x="2050096" y="1441942"/>
+            <a:ext cx="6358271" cy="2782728"/>
+          </a:xfrm>
+          <a:prstGeom prst="rect">
+            <a:avLst/>
+          </a:prstGeom>
+        </p:spPr>
+      </p:pic>
+    </p:spTree>
+    <p:extLst>
+      <p:ext uri="{BB962C8B-B14F-4D97-AF65-F5344CB8AC3E}">
+        <p14:creationId xmlns:p14="http://schemas.microsoft.com/office/powerpoint/2010/main" val="3072506851"/>
+      </p:ext>
+    </p:extLst>
+  </p:cSld>
+  <p:clrMapOvr>
+    <a:masterClrMapping/>
+  </p:clrMapOvr>
+</p:sld>
+</file>
+
 <file path=ppt/slides/slide2.xml><?xml version="1.0" encoding="utf-8"?>
 <p:sld xmlns:a="http://schemas.openxmlformats.org/drawingml/2006/main" xmlns:r="http://schemas.openxmlformats.org/officeDocument/2006/relationships" xmlns:p="http://schemas.openxmlformats.org/presentationml/2006/main">
   <p:cSld>
@@ -5562,7 +7578,7 @@
         </p:nvSpPr>
         <p:spPr>
           <a:xfrm>
-            <a:off x="1261873" y="1639019"/>
+            <a:off x="1323194" y="986354"/>
             <a:ext cx="9418320" cy="5757944"/>
           </a:xfrm>
         </p:spPr>
@@ -5572,7 +7588,7 @@
           </a:bodyPr>
           <a:lstStyle/>
           <a:p>
-            <a:pPr marL="457200" lvl="1" indent="0"/>
+            <a:pPr marL="457200" lvl="1"/>
             <a:r>
               <a:rPr lang="fr-FR" sz="2400" b="1" i="1" u="sng" dirty="0" smtClean="0">
                 <a:solidFill>
@@ -5702,14 +7718,6 @@
               </a:rPr>
               <a:t>Base de donnée</a:t>
             </a:r>
-            <a:r>
-              <a:rPr lang="fr-FR" sz="2400" dirty="0" smtClean="0">
-                <a:solidFill>
-                  <a:schemeClr val="tx1"/>
-                </a:solidFill>
-              </a:rPr>
-              <a:t/>
-            </a:r>
             <a:br>
               <a:rPr lang="fr-FR" sz="2400" dirty="0" smtClean="0">
                 <a:solidFill>
@@ -5723,15 +7731,7 @@
                   <a:schemeClr val="tx1"/>
                 </a:solidFill>
               </a:rPr>
-              <a:t>Le code </a:t>
-            </a:r>
-            <a:r>
-              <a:rPr lang="fr-FR" sz="2400" dirty="0" err="1" smtClean="0">
-                <a:solidFill>
-                  <a:schemeClr val="tx1"/>
-                </a:solidFill>
-              </a:rPr>
-              <a:t>Php</a:t>
+              <a:t>Langage serveur</a:t>
             </a:r>
             <a:r>
               <a:rPr lang="fr-FR" sz="2400" b="1" i="1" u="sng" dirty="0" smtClean="0">
@@ -5754,7 +7754,15 @@
                   <a:schemeClr val="tx1"/>
                 </a:solidFill>
               </a:rPr>
-              <a:t>Le code html </a:t>
+              <a:t>Langage client </a:t>
+            </a:r>
+            <a:r>
+              <a:rPr lang="fr-FR" sz="2200" dirty="0" smtClean="0">
+                <a:solidFill>
+                  <a:schemeClr val="tx1"/>
+                </a:solidFill>
+              </a:rPr>
+              <a:t/>
             </a:r>
             <a:br>
               <a:rPr lang="fr-FR" sz="2200" dirty="0" smtClean="0">
@@ -5769,15 +7777,7 @@
                   <a:schemeClr val="tx1"/>
                 </a:solidFill>
               </a:rPr>
-              <a:t>Le code </a:t>
-            </a:r>
-            <a:r>
-              <a:rPr lang="fr-FR" sz="2200" dirty="0" err="1" smtClean="0">
-                <a:solidFill>
-                  <a:schemeClr val="tx1"/>
-                </a:solidFill>
-              </a:rPr>
-              <a:t>css</a:t>
+              <a:t>Responsive web </a:t>
             </a:r>
             <a:r>
               <a:rPr lang="fr-FR" sz="2200" dirty="0" smtClean="0">
@@ -5785,7 +7785,7 @@
                   <a:schemeClr val="tx1"/>
                 </a:solidFill>
               </a:rPr>
-              <a:t/>
+              <a:t>design</a:t>
             </a:r>
             <a:br>
               <a:rPr lang="fr-FR" sz="2200" dirty="0" smtClean="0">
@@ -5795,20 +7795,28 @@
               </a:rPr>
             </a:br>
             <a:r>
-              <a:rPr lang="fr-FR" sz="2200" dirty="0" smtClean="0">
-                <a:solidFill>
-                  <a:schemeClr val="tx1"/>
-                </a:solidFill>
-              </a:rPr>
-              <a:t>Le code </a:t>
-            </a:r>
-            <a:r>
               <a:rPr lang="fr-FR" sz="2200" dirty="0" err="1" smtClean="0">
                 <a:solidFill>
                   <a:schemeClr val="tx1"/>
                 </a:solidFill>
               </a:rPr>
-              <a:t>Javascript</a:t>
+              <a:t>De</a:t>
+            </a:r>
+            <a:r>
+              <a:rPr lang="fr-FR" sz="2000" dirty="0" err="1" smtClean="0">
+                <a:solidFill>
+                  <a:schemeClr val="tx1"/>
+                </a:solidFill>
+              </a:rPr>
+              <a:t>sign</a:t>
+            </a:r>
+            <a:r>
+              <a:rPr lang="fr-FR" sz="2000" dirty="0" smtClean="0">
+                <a:solidFill>
+                  <a:schemeClr val="tx1"/>
+                </a:solidFill>
+              </a:rPr>
+              <a:t> pattern</a:t>
             </a:r>
             <a:r>
               <a:rPr lang="fr-FR" sz="2200" dirty="0" smtClean="0">
@@ -5831,7 +7839,23 @@
                   <a:schemeClr val="tx1"/>
                 </a:solidFill>
               </a:rPr>
-              <a:t>Responsive web design</a:t>
+              <a:t>Programmation orientée </a:t>
+            </a:r>
+            <a:r>
+              <a:rPr lang="fr-FR" sz="2200" dirty="0" smtClean="0">
+                <a:solidFill>
+                  <a:schemeClr val="tx1"/>
+                </a:solidFill>
+              </a:rPr>
+              <a:t>objet</a:t>
+            </a:r>
+            <a:r>
+              <a:rPr lang="fr-FR" sz="2200" dirty="0" smtClean="0">
+                <a:solidFill>
+                  <a:schemeClr val="tx1"/>
+                </a:solidFill>
+              </a:rPr>
+              <a:t/>
             </a:r>
             <a:br>
               <a:rPr lang="fr-FR" sz="2200" dirty="0" smtClean="0">
@@ -5846,7 +7870,7 @@
                   <a:schemeClr val="tx1"/>
                 </a:solidFill>
               </a:rPr>
-              <a:t>Programmation orientée objet</a:t>
+              <a:t>Rendu final de l’application</a:t>
             </a:r>
             <a:br>
               <a:rPr lang="fr-FR" sz="2200" dirty="0" smtClean="0">
@@ -5861,7 +7885,7 @@
                   <a:schemeClr val="tx1"/>
                 </a:solidFill>
               </a:rPr>
-              <a:t>Rendu final de l’application</a:t>
+              <a:t/>
             </a:r>
             <a:br>
               <a:rPr lang="fr-FR" sz="2200" dirty="0" smtClean="0">
@@ -5871,21 +7895,6 @@
               </a:rPr>
             </a:br>
             <a:r>
-              <a:rPr lang="fr-FR" sz="2200" dirty="0" smtClean="0">
-                <a:solidFill>
-                  <a:schemeClr val="tx1"/>
-                </a:solidFill>
-              </a:rPr>
-              <a:t/>
-            </a:r>
-            <a:br>
-              <a:rPr lang="fr-FR" sz="2200" dirty="0" smtClean="0">
-                <a:solidFill>
-                  <a:schemeClr val="tx1"/>
-                </a:solidFill>
-              </a:rPr>
-            </a:br>
-            <a:r>
               <a:rPr lang="fr-FR" sz="2400" b="1" i="1" u="sng" dirty="0" smtClean="0">
                 <a:solidFill>
                   <a:schemeClr val="tx1"/>
@@ -5906,7 +7915,38 @@
                   <a:schemeClr val="tx1"/>
                 </a:solidFill>
               </a:rPr>
-              <a:t>Compatibilité navigateurs</a:t>
+              <a:t>Compatibilité </a:t>
+            </a:r>
+            <a:r>
+              <a:rPr lang="fr-FR" sz="2400" dirty="0" smtClean="0">
+                <a:solidFill>
+                  <a:schemeClr val="tx1"/>
+                </a:solidFill>
+              </a:rPr>
+              <a:t>navigateurs</a:t>
+            </a:r>
+            <a:br>
+              <a:rPr lang="fr-FR" sz="2400" dirty="0" smtClean="0">
+                <a:solidFill>
+                  <a:schemeClr val="tx1"/>
+                </a:solidFill>
+              </a:rPr>
+            </a:br>
+            <a:r>
+              <a:rPr lang="fr-FR" sz="2400" dirty="0" smtClean="0">
+                <a:solidFill>
+                  <a:schemeClr val="tx1"/>
+                </a:solidFill>
+              </a:rPr>
+              <a:t>Logiciel de version</a:t>
+            </a:r>
+            <a:r>
+              <a:rPr lang="fr-FR" sz="2400" dirty="0" smtClean="0">
+                <a:solidFill>
+                  <a:schemeClr val="tx1"/>
+                </a:solidFill>
+              </a:rPr>
+              <a:t/>
             </a:r>
             <a:br>
               <a:rPr lang="fr-FR" sz="2400" dirty="0" smtClean="0">
@@ -5980,6 +8020,871 @@
         <p:cTn id="1" dur="indefinite" restart="never" nodeType="tmRoot"/>
       </p:par>
     </p:tnLst>
+  </p:timing>
+</p:sld>
+</file>
+
+<file path=ppt/slides/slide20.xml><?xml version="1.0" encoding="utf-8"?>
+<p:sld xmlns:a="http://schemas.openxmlformats.org/drawingml/2006/main" xmlns:r="http://schemas.openxmlformats.org/officeDocument/2006/relationships" xmlns:p="http://schemas.openxmlformats.org/presentationml/2006/main">
+  <p:cSld>
+    <p:spTree>
+      <p:nvGrpSpPr>
+        <p:cNvPr id="1" name=""/>
+        <p:cNvGrpSpPr/>
+        <p:nvPr/>
+      </p:nvGrpSpPr>
+      <p:grpSpPr>
+        <a:xfrm>
+          <a:off x="0" y="0"/>
+          <a:ext cx="0" cy="0"/>
+          <a:chOff x="0" y="0"/>
+          <a:chExt cx="0" cy="0"/>
+        </a:xfrm>
+      </p:grpSpPr>
+      <p:sp>
+        <p:nvSpPr>
+          <p:cNvPr id="4" name="ZoneTexte 3"/>
+          <p:cNvSpPr txBox="1"/>
+          <p:nvPr/>
+        </p:nvSpPr>
+        <p:spPr>
+          <a:xfrm>
+            <a:off x="4129992" y="1985197"/>
+            <a:ext cx="4964652" cy="369332"/>
+          </a:xfrm>
+          <a:prstGeom prst="rect">
+            <a:avLst/>
+          </a:prstGeom>
+          <a:noFill/>
+        </p:spPr>
+        <p:txBody>
+          <a:bodyPr wrap="square" rtlCol="0">
+            <a:spAutoFit/>
+          </a:bodyPr>
+          <a:lstStyle/>
+          <a:p>
+            <a:pPr marL="285750" indent="-285750">
+              <a:buFont typeface="Arial" panose="020B0604020202020204" pitchFamily="34" charset="0"/>
+              <a:buChar char="•"/>
+            </a:pPr>
+            <a:r>
+              <a:rPr lang="fr-FR" dirty="0" smtClean="0"/>
+              <a:t>Client FTP </a:t>
+            </a:r>
+            <a:r>
+              <a:rPr lang="fr-FR" dirty="0" err="1" smtClean="0"/>
+              <a:t>FileZilla</a:t>
+            </a:r>
+            <a:endParaRPr lang="fr-FR" dirty="0"/>
+          </a:p>
+        </p:txBody>
+      </p:sp>
+      <p:pic>
+        <p:nvPicPr>
+          <p:cNvPr id="5" name="Image 4"/>
+          <p:cNvPicPr>
+            <a:picLocks noChangeAspect="1"/>
+          </p:cNvPicPr>
+          <p:nvPr/>
+        </p:nvPicPr>
+        <p:blipFill>
+          <a:blip r:embed="rId2">
+            <a:extLst>
+              <a:ext uri="{28A0092B-C50C-407E-A947-70E740481C1C}">
+                <a14:useLocalDpi xmlns:a14="http://schemas.microsoft.com/office/drawing/2010/main" val="0"/>
+              </a:ext>
+            </a:extLst>
+          </a:blip>
+          <a:stretch>
+            <a:fillRect/>
+          </a:stretch>
+        </p:blipFill>
+        <p:spPr>
+          <a:xfrm>
+            <a:off x="3222142" y="2668733"/>
+            <a:ext cx="4852098" cy="3671457"/>
+          </a:xfrm>
+          <a:prstGeom prst="rect">
+            <a:avLst/>
+          </a:prstGeom>
+        </p:spPr>
+      </p:pic>
+      <p:sp>
+        <p:nvSpPr>
+          <p:cNvPr id="6" name="Rectangle 5"/>
+          <p:cNvSpPr/>
+          <p:nvPr/>
+        </p:nvSpPr>
+        <p:spPr>
+          <a:xfrm>
+            <a:off x="3105847" y="563370"/>
+            <a:ext cx="4732386" cy="646331"/>
+          </a:xfrm>
+          <a:prstGeom prst="rect">
+            <a:avLst/>
+          </a:prstGeom>
+        </p:spPr>
+        <p:txBody>
+          <a:bodyPr wrap="none">
+            <a:spAutoFit/>
+          </a:bodyPr>
+          <a:lstStyle/>
+          <a:p>
+            <a:pPr lvl="1"/>
+            <a:r>
+              <a:rPr lang="fr-FR" sz="3600" dirty="0" smtClean="0"/>
+              <a:t>Mise en production</a:t>
+            </a:r>
+            <a:endParaRPr lang="fr-FR" sz="3600" dirty="0"/>
+          </a:p>
+        </p:txBody>
+      </p:sp>
+    </p:spTree>
+    <p:extLst>
+      <p:ext uri="{BB962C8B-B14F-4D97-AF65-F5344CB8AC3E}">
+        <p14:creationId xmlns:p14="http://schemas.microsoft.com/office/powerpoint/2010/main" val="968293604"/>
+      </p:ext>
+    </p:extLst>
+  </p:cSld>
+  <p:clrMapOvr>
+    <a:masterClrMapping/>
+  </p:clrMapOvr>
+  <p:timing>
+    <p:tnLst>
+      <p:par>
+        <p:cTn id="1" dur="indefinite" restart="never" nodeType="tmRoot">
+          <p:childTnLst>
+            <p:seq concurrent="1" nextAc="seek">
+              <p:cTn id="2" dur="indefinite" nodeType="mainSeq">
+                <p:childTnLst>
+                  <p:par>
+                    <p:cTn id="3" fill="hold">
+                      <p:stCondLst>
+                        <p:cond delay="indefinite"/>
+                        <p:cond evt="onBegin" delay="0">
+                          <p:tn val="2"/>
+                        </p:cond>
+                      </p:stCondLst>
+                      <p:childTnLst>
+                        <p:par>
+                          <p:cTn id="4" fill="hold">
+                            <p:stCondLst>
+                              <p:cond delay="0"/>
+                            </p:stCondLst>
+                            <p:childTnLst>
+                              <p:par>
+                                <p:cTn id="5" presetID="10" presetClass="entr" presetSubtype="0" fill="hold" nodeType="withEffect">
+                                  <p:stCondLst>
+                                    <p:cond delay="0"/>
+                                  </p:stCondLst>
+                                  <p:childTnLst>
+                                    <p:set>
+                                      <p:cBhvr>
+                                        <p:cTn id="6" dur="1" fill="hold">
+                                          <p:stCondLst>
+                                            <p:cond delay="0"/>
+                                          </p:stCondLst>
+                                        </p:cTn>
+                                        <p:tgtEl>
+                                          <p:spTgt spid="5"/>
+                                        </p:tgtEl>
+                                        <p:attrNameLst>
+                                          <p:attrName>style.visibility</p:attrName>
+                                        </p:attrNameLst>
+                                      </p:cBhvr>
+                                      <p:to>
+                                        <p:strVal val="visible"/>
+                                      </p:to>
+                                    </p:set>
+                                    <p:animEffect transition="in" filter="fade">
+                                      <p:cBhvr>
+                                        <p:cTn id="7" dur="500"/>
+                                        <p:tgtEl>
+                                          <p:spTgt spid="5"/>
+                                        </p:tgtEl>
+                                      </p:cBhvr>
+                                    </p:animEffect>
+                                  </p:childTnLst>
+                                </p:cTn>
+                              </p:par>
+                              <p:par>
+                                <p:cTn id="8" presetID="10" presetClass="entr" presetSubtype="0" fill="hold" grpId="0" nodeType="withEffect">
+                                  <p:stCondLst>
+                                    <p:cond delay="0"/>
+                                  </p:stCondLst>
+                                  <p:childTnLst>
+                                    <p:set>
+                                      <p:cBhvr>
+                                        <p:cTn id="9" dur="1" fill="hold">
+                                          <p:stCondLst>
+                                            <p:cond delay="0"/>
+                                          </p:stCondLst>
+                                        </p:cTn>
+                                        <p:tgtEl>
+                                          <p:spTgt spid="4"/>
+                                        </p:tgtEl>
+                                        <p:attrNameLst>
+                                          <p:attrName>style.visibility</p:attrName>
+                                        </p:attrNameLst>
+                                      </p:cBhvr>
+                                      <p:to>
+                                        <p:strVal val="visible"/>
+                                      </p:to>
+                                    </p:set>
+                                    <p:animEffect transition="in" filter="fade">
+                                      <p:cBhvr>
+                                        <p:cTn id="10" dur="500"/>
+                                        <p:tgtEl>
+                                          <p:spTgt spid="4"/>
+                                        </p:tgtEl>
+                                      </p:cBhvr>
+                                    </p:animEffect>
+                                  </p:childTnLst>
+                                </p:cTn>
+                              </p:par>
+                            </p:childTnLst>
+                          </p:cTn>
+                        </p:par>
+                      </p:childTnLst>
+                    </p:cTn>
+                  </p:par>
+                </p:childTnLst>
+              </p:cTn>
+              <p:prevCondLst>
+                <p:cond evt="onPrev" delay="0">
+                  <p:tgtEl>
+                    <p:sldTgt/>
+                  </p:tgtEl>
+                </p:cond>
+              </p:prevCondLst>
+              <p:nextCondLst>
+                <p:cond evt="onNext" delay="0">
+                  <p:tgtEl>
+                    <p:sldTgt/>
+                  </p:tgtEl>
+                </p:cond>
+              </p:nextCondLst>
+            </p:seq>
+          </p:childTnLst>
+        </p:cTn>
+      </p:par>
+    </p:tnLst>
+    <p:bldLst>
+      <p:bldP spid="4" grpId="0"/>
+    </p:bldLst>
+  </p:timing>
+</p:sld>
+</file>
+
+<file path=ppt/slides/slide21.xml><?xml version="1.0" encoding="utf-8"?>
+<p:sld xmlns:a="http://schemas.openxmlformats.org/drawingml/2006/main" xmlns:r="http://schemas.openxmlformats.org/officeDocument/2006/relationships" xmlns:p="http://schemas.openxmlformats.org/presentationml/2006/main">
+  <p:cSld>
+    <p:spTree>
+      <p:nvGrpSpPr>
+        <p:cNvPr id="1" name=""/>
+        <p:cNvGrpSpPr/>
+        <p:nvPr/>
+      </p:nvGrpSpPr>
+      <p:grpSpPr>
+        <a:xfrm>
+          <a:off x="0" y="0"/>
+          <a:ext cx="0" cy="0"/>
+          <a:chOff x="0" y="0"/>
+          <a:chExt cx="0" cy="0"/>
+        </a:xfrm>
+      </p:grpSpPr>
+      <p:sp>
+        <p:nvSpPr>
+          <p:cNvPr id="4" name="Titre 1"/>
+          <p:cNvSpPr>
+            <a:spLocks noGrp="1"/>
+          </p:cNvSpPr>
+          <p:nvPr>
+            <p:ph type="title"/>
+          </p:nvPr>
+        </p:nvSpPr>
+        <p:spPr>
+          <a:xfrm>
+            <a:off x="2391955" y="416725"/>
+            <a:ext cx="10271748" cy="1280890"/>
+          </a:xfrm>
+        </p:spPr>
+        <p:txBody>
+          <a:bodyPr>
+            <a:normAutofit fontScale="90000"/>
+          </a:bodyPr>
+          <a:lstStyle/>
+          <a:p>
+            <a:r>
+              <a:rPr lang="fr-FR" sz="4000" dirty="0"/>
+              <a:t>Problématiques rencontrées</a:t>
+            </a:r>
+            <a:r>
+              <a:rPr lang="fr-FR" dirty="0"/>
+              <a:t/>
+            </a:r>
+            <a:br>
+              <a:rPr lang="fr-FR" dirty="0"/>
+            </a:br>
+            <a:endParaRPr lang="fr-FR" dirty="0"/>
+          </a:p>
+        </p:txBody>
+      </p:sp>
+      <p:sp>
+        <p:nvSpPr>
+          <p:cNvPr id="5" name="ZoneTexte 4"/>
+          <p:cNvSpPr txBox="1"/>
+          <p:nvPr/>
+        </p:nvSpPr>
+        <p:spPr>
+          <a:xfrm>
+            <a:off x="4337107" y="2404211"/>
+            <a:ext cx="5389073" cy="369332"/>
+          </a:xfrm>
+          <a:prstGeom prst="rect">
+            <a:avLst/>
+          </a:prstGeom>
+          <a:noFill/>
+        </p:spPr>
+        <p:txBody>
+          <a:bodyPr wrap="square" rtlCol="0">
+            <a:spAutoFit/>
+          </a:bodyPr>
+          <a:lstStyle/>
+          <a:p>
+            <a:r>
+              <a:rPr lang="fr-FR" dirty="0" smtClean="0"/>
+              <a:t>Mise en ligne </a:t>
+            </a:r>
+            <a:endParaRPr lang="fr-FR" dirty="0"/>
+          </a:p>
+        </p:txBody>
+      </p:sp>
+      <p:sp>
+        <p:nvSpPr>
+          <p:cNvPr id="6" name="ZoneTexte 5"/>
+          <p:cNvSpPr txBox="1"/>
+          <p:nvPr/>
+        </p:nvSpPr>
+        <p:spPr>
+          <a:xfrm>
+            <a:off x="4833292" y="4512452"/>
+            <a:ext cx="5389073" cy="369332"/>
+          </a:xfrm>
+          <a:prstGeom prst="rect">
+            <a:avLst/>
+          </a:prstGeom>
+          <a:noFill/>
+        </p:spPr>
+        <p:txBody>
+          <a:bodyPr wrap="square" rtlCol="0">
+            <a:spAutoFit/>
+          </a:bodyPr>
+          <a:lstStyle/>
+          <a:p>
+            <a:r>
+              <a:rPr lang="fr-FR" dirty="0" smtClean="0"/>
+              <a:t>MVC</a:t>
+            </a:r>
+            <a:endParaRPr lang="fr-FR" dirty="0"/>
+          </a:p>
+        </p:txBody>
+      </p:sp>
+      <p:sp>
+        <p:nvSpPr>
+          <p:cNvPr id="8" name="Chevron 7"/>
+          <p:cNvSpPr/>
+          <p:nvPr/>
+        </p:nvSpPr>
+        <p:spPr>
+          <a:xfrm rot="5400000">
+            <a:off x="4923678" y="1623611"/>
+            <a:ext cx="484632" cy="558594"/>
+          </a:xfrm>
+          <a:prstGeom prst="chevron">
+            <a:avLst/>
+          </a:prstGeom>
+          <a:ln>
+            <a:solidFill>
+              <a:schemeClr val="tx2">
+                <a:lumMod val="60000"/>
+                <a:lumOff val="40000"/>
+              </a:schemeClr>
+            </a:solidFill>
+          </a:ln>
+        </p:spPr>
+        <p:style>
+          <a:lnRef idx="2">
+            <a:schemeClr val="accent1">
+              <a:shade val="50000"/>
+            </a:schemeClr>
+          </a:lnRef>
+          <a:fillRef idx="1">
+            <a:schemeClr val="accent1"/>
+          </a:fillRef>
+          <a:effectRef idx="0">
+            <a:schemeClr val="accent1"/>
+          </a:effectRef>
+          <a:fontRef idx="minor">
+            <a:schemeClr val="lt1"/>
+          </a:fontRef>
+        </p:style>
+        <p:txBody>
+          <a:bodyPr rtlCol="0" anchor="ctr"/>
+          <a:lstStyle/>
+          <a:p>
+            <a:pPr algn="ctr"/>
+            <a:endParaRPr lang="fr-FR">
+              <a:solidFill>
+                <a:schemeClr val="tx1"/>
+              </a:solidFill>
+            </a:endParaRPr>
+          </a:p>
+        </p:txBody>
+      </p:sp>
+      <p:sp>
+        <p:nvSpPr>
+          <p:cNvPr id="9" name="Chevron 8"/>
+          <p:cNvSpPr/>
+          <p:nvPr/>
+        </p:nvSpPr>
+        <p:spPr>
+          <a:xfrm rot="5400000">
+            <a:off x="4908072" y="3308435"/>
+            <a:ext cx="484632" cy="558594"/>
+          </a:xfrm>
+          <a:prstGeom prst="chevron">
+            <a:avLst/>
+          </a:prstGeom>
+          <a:ln>
+            <a:solidFill>
+              <a:schemeClr val="tx2">
+                <a:lumMod val="60000"/>
+                <a:lumOff val="40000"/>
+              </a:schemeClr>
+            </a:solidFill>
+          </a:ln>
+        </p:spPr>
+        <p:style>
+          <a:lnRef idx="2">
+            <a:schemeClr val="accent1">
+              <a:shade val="50000"/>
+            </a:schemeClr>
+          </a:lnRef>
+          <a:fillRef idx="1">
+            <a:schemeClr val="accent1"/>
+          </a:fillRef>
+          <a:effectRef idx="0">
+            <a:schemeClr val="accent1"/>
+          </a:effectRef>
+          <a:fontRef idx="minor">
+            <a:schemeClr val="lt1"/>
+          </a:fontRef>
+        </p:style>
+        <p:txBody>
+          <a:bodyPr rtlCol="0" anchor="ctr"/>
+          <a:lstStyle/>
+          <a:p>
+            <a:pPr algn="ctr"/>
+            <a:endParaRPr lang="fr-FR">
+              <a:solidFill>
+                <a:schemeClr val="tx1"/>
+              </a:solidFill>
+            </a:endParaRPr>
+          </a:p>
+        </p:txBody>
+      </p:sp>
+    </p:spTree>
+    <p:extLst>
+      <p:ext uri="{BB962C8B-B14F-4D97-AF65-F5344CB8AC3E}">
+        <p14:creationId xmlns:p14="http://schemas.microsoft.com/office/powerpoint/2010/main" val="2295940283"/>
+      </p:ext>
+    </p:extLst>
+  </p:cSld>
+  <p:clrMapOvr>
+    <a:masterClrMapping/>
+  </p:clrMapOvr>
+  <p:timing>
+    <p:tnLst>
+      <p:par>
+        <p:cTn id="1" dur="indefinite" restart="never" nodeType="tmRoot">
+          <p:childTnLst>
+            <p:seq concurrent="1" nextAc="seek">
+              <p:cTn id="2" dur="indefinite" nodeType="mainSeq">
+                <p:childTnLst>
+                  <p:par>
+                    <p:cTn id="3" fill="hold">
+                      <p:stCondLst>
+                        <p:cond delay="indefinite"/>
+                      </p:stCondLst>
+                      <p:childTnLst>
+                        <p:par>
+                          <p:cTn id="4" fill="hold">
+                            <p:stCondLst>
+                              <p:cond delay="0"/>
+                            </p:stCondLst>
+                            <p:childTnLst>
+                              <p:par>
+                                <p:cTn id="5" presetID="2" presetClass="entr" presetSubtype="1" fill="hold" grpId="0" nodeType="clickEffect">
+                                  <p:stCondLst>
+                                    <p:cond delay="0"/>
+                                  </p:stCondLst>
+                                  <p:childTnLst>
+                                    <p:set>
+                                      <p:cBhvr>
+                                        <p:cTn id="6" dur="1" fill="hold">
+                                          <p:stCondLst>
+                                            <p:cond delay="0"/>
+                                          </p:stCondLst>
+                                        </p:cTn>
+                                        <p:tgtEl>
+                                          <p:spTgt spid="5"/>
+                                        </p:tgtEl>
+                                        <p:attrNameLst>
+                                          <p:attrName>style.visibility</p:attrName>
+                                        </p:attrNameLst>
+                                      </p:cBhvr>
+                                      <p:to>
+                                        <p:strVal val="visible"/>
+                                      </p:to>
+                                    </p:set>
+                                    <p:anim calcmode="lin" valueType="num">
+                                      <p:cBhvr additive="base">
+                                        <p:cTn id="7" dur="500" fill="hold"/>
+                                        <p:tgtEl>
+                                          <p:spTgt spid="5"/>
+                                        </p:tgtEl>
+                                        <p:attrNameLst>
+                                          <p:attrName>ppt_x</p:attrName>
+                                        </p:attrNameLst>
+                                      </p:cBhvr>
+                                      <p:tavLst>
+                                        <p:tav tm="0">
+                                          <p:val>
+                                            <p:strVal val="#ppt_x"/>
+                                          </p:val>
+                                        </p:tav>
+                                        <p:tav tm="100000">
+                                          <p:val>
+                                            <p:strVal val="#ppt_x"/>
+                                          </p:val>
+                                        </p:tav>
+                                      </p:tavLst>
+                                    </p:anim>
+                                    <p:anim calcmode="lin" valueType="num">
+                                      <p:cBhvr additive="base">
+                                        <p:cTn id="8" dur="500" fill="hold"/>
+                                        <p:tgtEl>
+                                          <p:spTgt spid="5"/>
+                                        </p:tgtEl>
+                                        <p:attrNameLst>
+                                          <p:attrName>ppt_y</p:attrName>
+                                        </p:attrNameLst>
+                                      </p:cBhvr>
+                                      <p:tavLst>
+                                        <p:tav tm="0">
+                                          <p:val>
+                                            <p:strVal val="0-#ppt_h/2"/>
+                                          </p:val>
+                                        </p:tav>
+                                        <p:tav tm="100000">
+                                          <p:val>
+                                            <p:strVal val="#ppt_y"/>
+                                          </p:val>
+                                        </p:tav>
+                                      </p:tavLst>
+                                    </p:anim>
+                                  </p:childTnLst>
+                                </p:cTn>
+                              </p:par>
+                            </p:childTnLst>
+                          </p:cTn>
+                        </p:par>
+                      </p:childTnLst>
+                    </p:cTn>
+                  </p:par>
+                  <p:par>
+                    <p:cTn id="9" fill="hold">
+                      <p:stCondLst>
+                        <p:cond delay="indefinite"/>
+                      </p:stCondLst>
+                      <p:childTnLst>
+                        <p:par>
+                          <p:cTn id="10" fill="hold">
+                            <p:stCondLst>
+                              <p:cond delay="0"/>
+                            </p:stCondLst>
+                            <p:childTnLst>
+                              <p:par>
+                                <p:cTn id="11" presetID="2" presetClass="entr" presetSubtype="1" fill="hold" grpId="0" nodeType="clickEffect">
+                                  <p:stCondLst>
+                                    <p:cond delay="0"/>
+                                  </p:stCondLst>
+                                  <p:childTnLst>
+                                    <p:set>
+                                      <p:cBhvr>
+                                        <p:cTn id="12" dur="1" fill="hold">
+                                          <p:stCondLst>
+                                            <p:cond delay="0"/>
+                                          </p:stCondLst>
+                                        </p:cTn>
+                                        <p:tgtEl>
+                                          <p:spTgt spid="8"/>
+                                        </p:tgtEl>
+                                        <p:attrNameLst>
+                                          <p:attrName>style.visibility</p:attrName>
+                                        </p:attrNameLst>
+                                      </p:cBhvr>
+                                      <p:to>
+                                        <p:strVal val="visible"/>
+                                      </p:to>
+                                    </p:set>
+                                    <p:anim calcmode="lin" valueType="num">
+                                      <p:cBhvr additive="base">
+                                        <p:cTn id="13" dur="500" fill="hold"/>
+                                        <p:tgtEl>
+                                          <p:spTgt spid="8"/>
+                                        </p:tgtEl>
+                                        <p:attrNameLst>
+                                          <p:attrName>ppt_x</p:attrName>
+                                        </p:attrNameLst>
+                                      </p:cBhvr>
+                                      <p:tavLst>
+                                        <p:tav tm="0">
+                                          <p:val>
+                                            <p:strVal val="#ppt_x"/>
+                                          </p:val>
+                                        </p:tav>
+                                        <p:tav tm="100000">
+                                          <p:val>
+                                            <p:strVal val="#ppt_x"/>
+                                          </p:val>
+                                        </p:tav>
+                                      </p:tavLst>
+                                    </p:anim>
+                                    <p:anim calcmode="lin" valueType="num">
+                                      <p:cBhvr additive="base">
+                                        <p:cTn id="14" dur="500" fill="hold"/>
+                                        <p:tgtEl>
+                                          <p:spTgt spid="8"/>
+                                        </p:tgtEl>
+                                        <p:attrNameLst>
+                                          <p:attrName>ppt_y</p:attrName>
+                                        </p:attrNameLst>
+                                      </p:cBhvr>
+                                      <p:tavLst>
+                                        <p:tav tm="0">
+                                          <p:val>
+                                            <p:strVal val="0-#ppt_h/2"/>
+                                          </p:val>
+                                        </p:tav>
+                                        <p:tav tm="100000">
+                                          <p:val>
+                                            <p:strVal val="#ppt_y"/>
+                                          </p:val>
+                                        </p:tav>
+                                      </p:tavLst>
+                                    </p:anim>
+                                  </p:childTnLst>
+                                </p:cTn>
+                              </p:par>
+                              <p:par>
+                                <p:cTn id="15" presetID="2" presetClass="entr" presetSubtype="1" fill="hold" grpId="0" nodeType="withEffect">
+                                  <p:stCondLst>
+                                    <p:cond delay="0"/>
+                                  </p:stCondLst>
+                                  <p:childTnLst>
+                                    <p:set>
+                                      <p:cBhvr>
+                                        <p:cTn id="16" dur="1" fill="hold">
+                                          <p:stCondLst>
+                                            <p:cond delay="0"/>
+                                          </p:stCondLst>
+                                        </p:cTn>
+                                        <p:tgtEl>
+                                          <p:spTgt spid="6"/>
+                                        </p:tgtEl>
+                                        <p:attrNameLst>
+                                          <p:attrName>style.visibility</p:attrName>
+                                        </p:attrNameLst>
+                                      </p:cBhvr>
+                                      <p:to>
+                                        <p:strVal val="visible"/>
+                                      </p:to>
+                                    </p:set>
+                                    <p:anim calcmode="lin" valueType="num">
+                                      <p:cBhvr additive="base">
+                                        <p:cTn id="17" dur="500" fill="hold"/>
+                                        <p:tgtEl>
+                                          <p:spTgt spid="6"/>
+                                        </p:tgtEl>
+                                        <p:attrNameLst>
+                                          <p:attrName>ppt_x</p:attrName>
+                                        </p:attrNameLst>
+                                      </p:cBhvr>
+                                      <p:tavLst>
+                                        <p:tav tm="0">
+                                          <p:val>
+                                            <p:strVal val="#ppt_x"/>
+                                          </p:val>
+                                        </p:tav>
+                                        <p:tav tm="100000">
+                                          <p:val>
+                                            <p:strVal val="#ppt_x"/>
+                                          </p:val>
+                                        </p:tav>
+                                      </p:tavLst>
+                                    </p:anim>
+                                    <p:anim calcmode="lin" valueType="num">
+                                      <p:cBhvr additive="base">
+                                        <p:cTn id="18" dur="500" fill="hold"/>
+                                        <p:tgtEl>
+                                          <p:spTgt spid="6"/>
+                                        </p:tgtEl>
+                                        <p:attrNameLst>
+                                          <p:attrName>ppt_y</p:attrName>
+                                        </p:attrNameLst>
+                                      </p:cBhvr>
+                                      <p:tavLst>
+                                        <p:tav tm="0">
+                                          <p:val>
+                                            <p:strVal val="0-#ppt_h/2"/>
+                                          </p:val>
+                                        </p:tav>
+                                        <p:tav tm="100000">
+                                          <p:val>
+                                            <p:strVal val="#ppt_y"/>
+                                          </p:val>
+                                        </p:tav>
+                                      </p:tavLst>
+                                    </p:anim>
+                                  </p:childTnLst>
+                                </p:cTn>
+                              </p:par>
+                            </p:childTnLst>
+                          </p:cTn>
+                        </p:par>
+                      </p:childTnLst>
+                    </p:cTn>
+                  </p:par>
+                  <p:par>
+                    <p:cTn id="19" fill="hold">
+                      <p:stCondLst>
+                        <p:cond delay="indefinite"/>
+                      </p:stCondLst>
+                      <p:childTnLst>
+                        <p:par>
+                          <p:cTn id="20" fill="hold">
+                            <p:stCondLst>
+                              <p:cond delay="0"/>
+                            </p:stCondLst>
+                            <p:childTnLst>
+                              <p:par>
+                                <p:cTn id="21" presetID="2" presetClass="entr" presetSubtype="1" fill="hold" grpId="0" nodeType="clickEffect">
+                                  <p:stCondLst>
+                                    <p:cond delay="0"/>
+                                  </p:stCondLst>
+                                  <p:childTnLst>
+                                    <p:set>
+                                      <p:cBhvr>
+                                        <p:cTn id="22" dur="1" fill="hold">
+                                          <p:stCondLst>
+                                            <p:cond delay="0"/>
+                                          </p:stCondLst>
+                                        </p:cTn>
+                                        <p:tgtEl>
+                                          <p:spTgt spid="9"/>
+                                        </p:tgtEl>
+                                        <p:attrNameLst>
+                                          <p:attrName>style.visibility</p:attrName>
+                                        </p:attrNameLst>
+                                      </p:cBhvr>
+                                      <p:to>
+                                        <p:strVal val="visible"/>
+                                      </p:to>
+                                    </p:set>
+                                    <p:anim calcmode="lin" valueType="num">
+                                      <p:cBhvr additive="base">
+                                        <p:cTn id="23" dur="500" fill="hold"/>
+                                        <p:tgtEl>
+                                          <p:spTgt spid="9"/>
+                                        </p:tgtEl>
+                                        <p:attrNameLst>
+                                          <p:attrName>ppt_x</p:attrName>
+                                        </p:attrNameLst>
+                                      </p:cBhvr>
+                                      <p:tavLst>
+                                        <p:tav tm="0">
+                                          <p:val>
+                                            <p:strVal val="#ppt_x"/>
+                                          </p:val>
+                                        </p:tav>
+                                        <p:tav tm="100000">
+                                          <p:val>
+                                            <p:strVal val="#ppt_x"/>
+                                          </p:val>
+                                        </p:tav>
+                                      </p:tavLst>
+                                    </p:anim>
+                                    <p:anim calcmode="lin" valueType="num">
+                                      <p:cBhvr additive="base">
+                                        <p:cTn id="24" dur="500" fill="hold"/>
+                                        <p:tgtEl>
+                                          <p:spTgt spid="9"/>
+                                        </p:tgtEl>
+                                        <p:attrNameLst>
+                                          <p:attrName>ppt_y</p:attrName>
+                                        </p:attrNameLst>
+                                      </p:cBhvr>
+                                      <p:tavLst>
+                                        <p:tav tm="0">
+                                          <p:val>
+                                            <p:strVal val="0-#ppt_h/2"/>
+                                          </p:val>
+                                        </p:tav>
+                                        <p:tav tm="100000">
+                                          <p:val>
+                                            <p:strVal val="#ppt_y"/>
+                                          </p:val>
+                                        </p:tav>
+                                      </p:tavLst>
+                                    </p:anim>
+                                  </p:childTnLst>
+                                </p:cTn>
+                              </p:par>
+                            </p:childTnLst>
+                          </p:cTn>
+                        </p:par>
+                      </p:childTnLst>
+                    </p:cTn>
+                  </p:par>
+                </p:childTnLst>
+              </p:cTn>
+              <p:prevCondLst>
+                <p:cond evt="onPrev" delay="0">
+                  <p:tgtEl>
+                    <p:sldTgt/>
+                  </p:tgtEl>
+                </p:cond>
+              </p:prevCondLst>
+              <p:nextCondLst>
+                <p:cond evt="onNext" delay="0">
+                  <p:tgtEl>
+                    <p:sldTgt/>
+                  </p:tgtEl>
+                </p:cond>
+              </p:nextCondLst>
+            </p:seq>
+          </p:childTnLst>
+        </p:cTn>
+      </p:par>
+    </p:tnLst>
+    <p:bldLst>
+      <p:bldP spid="5" grpId="0"/>
+      <p:bldP spid="6" grpId="0"/>
+      <p:bldP spid="8" grpId="0" animBg="1"/>
+      <p:bldP spid="9" grpId="0" animBg="1"/>
+    </p:bldLst>
   </p:timing>
 </p:sld>
 </file>
@@ -6221,7 +9126,6 @@
               <a:rPr lang="fr-FR" dirty="0" smtClean="0"/>
               <a:t>"</a:t>
             </a:r>
-            <a:endParaRPr lang="fr-FR" dirty="0" smtClean="0"/>
           </a:p>
         </p:txBody>
       </p:sp>
@@ -6253,13 +9157,8 @@
             </a:pPr>
             <a:r>
               <a:rPr lang="fr-FR" dirty="0" smtClean="0"/>
-              <a:t>Amélioration </a:t>
-            </a:r>
-            <a:r>
-              <a:rPr lang="fr-FR" dirty="0" smtClean="0"/>
-              <a:t>de son roman grâce aux lecteurs</a:t>
-            </a:r>
-            <a:endParaRPr lang="fr-FR" dirty="0" smtClean="0"/>
+              <a:t>Amélioration de son roman grâce aux lecteurs</a:t>
+            </a:r>
           </a:p>
         </p:txBody>
       </p:sp>
@@ -6293,7 +9192,6 @@
               <a:rPr lang="fr-FR" dirty="0" smtClean="0"/>
               <a:t>Meilleur visibilité de son travail</a:t>
             </a:r>
-            <a:endParaRPr lang="fr-FR" dirty="0" smtClean="0"/>
           </a:p>
         </p:txBody>
       </p:sp>
@@ -6325,13 +9223,8 @@
             </a:pPr>
             <a:r>
               <a:rPr lang="fr-FR" dirty="0" smtClean="0"/>
-              <a:t>Augmentation </a:t>
-            </a:r>
-            <a:r>
-              <a:rPr lang="fr-FR" dirty="0" smtClean="0"/>
-              <a:t>de sa notoriété et de son CA</a:t>
-            </a:r>
-            <a:endParaRPr lang="fr-FR" dirty="0" smtClean="0"/>
+              <a:t>Augmentation de sa notoriété et de son CA</a:t>
+            </a:r>
           </a:p>
         </p:txBody>
       </p:sp>
@@ -6806,7 +9699,6 @@
               <a:rPr lang="fr-FR" dirty="0"/>
               <a:t>PHP et avec une base de données MySQL</a:t>
             </a:r>
-            <a:endParaRPr lang="fr-FR" dirty="0"/>
           </a:p>
         </p:txBody>
       </p:sp>
@@ -8337,36 +11229,6 @@
       </p:sp>
       <p:sp>
         <p:nvSpPr>
-          <p:cNvPr id="6" name="ZoneTexte 5"/>
-          <p:cNvSpPr txBox="1"/>
-          <p:nvPr/>
-        </p:nvSpPr>
-        <p:spPr>
-          <a:xfrm>
-            <a:off x="10084279" y="2493034"/>
-            <a:ext cx="1173193" cy="646331"/>
-          </a:xfrm>
-          <a:prstGeom prst="rect">
-            <a:avLst/>
-          </a:prstGeom>
-          <a:noFill/>
-        </p:spPr>
-        <p:txBody>
-          <a:bodyPr wrap="square" rtlCol="0">
-            <a:spAutoFit/>
-          </a:bodyPr>
-          <a:lstStyle/>
-          <a:p>
-            <a:r>
-              <a:rPr lang="fr-FR" dirty="0" smtClean="0"/>
-              <a:t>Design pattern</a:t>
-            </a:r>
-            <a:endParaRPr lang="fr-FR" dirty="0"/>
-          </a:p>
-        </p:txBody>
-      </p:sp>
-      <p:sp>
-        <p:nvSpPr>
           <p:cNvPr id="7" name="Flèche vers le bas 6"/>
           <p:cNvSpPr/>
           <p:nvPr/>
@@ -8415,6 +11277,13 @@
   <p:clrMapOvr>
     <a:masterClrMapping/>
   </p:clrMapOvr>
+  <p:timing>
+    <p:tnLst>
+      <p:par>
+        <p:cTn id="1" dur="indefinite" restart="never" nodeType="tmRoot"/>
+      </p:par>
+    </p:tnLst>
+  </p:timing>
 </p:sld>
 </file>
 
@@ -8489,6 +11358,13 @@
   <p:clrMapOvr>
     <a:masterClrMapping/>
   </p:clrMapOvr>
+  <p:timing>
+    <p:tnLst>
+      <p:par>
+        <p:cTn id="1" dur="indefinite" restart="never" nodeType="tmRoot"/>
+      </p:par>
+    </p:tnLst>
+  </p:timing>
 </p:sld>
 </file>
 
@@ -8756,6 +11632,13 @@
   <p:clrMapOvr>
     <a:masterClrMapping/>
   </p:clrMapOvr>
+  <p:timing>
+    <p:tnLst>
+      <p:par>
+        <p:cTn id="1" dur="indefinite" restart="never" nodeType="tmRoot"/>
+      </p:par>
+    </p:tnLst>
+  </p:timing>
 </p:sld>
 </file>
 

</xml_diff>

<commit_message>
adding link git hub
</commit_message>
<xml_diff>
--- a/powerpoint/project4.pptx
+++ b/powerpoint/project4.pptx
@@ -299,7 +299,7 @@
           <a:p>
             <a:fld id="{9E016143-E03C-4CFD-AFDC-14E5BDEA754C}" type="datetimeFigureOut">
               <a:rPr lang="en-US" dirty="0"/>
-              <a:t>9/13/2018</a:t>
+              <a:t>9/18/2018</a:t>
             </a:fld>
             <a:endParaRPr lang="en-US" dirty="0"/>
           </a:p>
@@ -523,7 +523,7 @@
           <a:p>
             <a:fld id="{C033E54A-A8CA-48C1-9504-691B58049D29}" type="datetimeFigureOut">
               <a:rPr lang="en-US" dirty="0"/>
-              <a:t>9/13/2018</a:t>
+              <a:t>9/18/2018</a:t>
             </a:fld>
             <a:endParaRPr lang="en-US" dirty="0"/>
           </a:p>
@@ -698,7 +698,7 @@
           <a:p>
             <a:fld id="{B5F6C806-BBF7-471C-9527-881CE2266695}" type="datetimeFigureOut">
               <a:rPr lang="en-US" dirty="0"/>
-              <a:t>9/13/2018</a:t>
+              <a:t>9/18/2018</a:t>
             </a:fld>
             <a:endParaRPr lang="en-US" dirty="0"/>
           </a:p>
@@ -863,7 +863,7 @@
           <a:p>
             <a:fld id="{78C94063-DF36-4330-A365-08DA1FA5B7D6}" type="datetimeFigureOut">
               <a:rPr lang="en-US" dirty="0"/>
-              <a:t>9/13/2018</a:t>
+              <a:t>9/18/2018</a:t>
             </a:fld>
             <a:endParaRPr lang="en-US" dirty="0"/>
           </a:p>
@@ -1112,7 +1112,7 @@
           <a:p>
             <a:fld id="{908A7C6C-0F39-4D70-8E8D-FE5B9C95FA73}" type="datetimeFigureOut">
               <a:rPr lang="en-US" dirty="0"/>
-              <a:t>9/13/2018</a:t>
+              <a:t>9/18/2018</a:t>
             </a:fld>
             <a:endParaRPr lang="en-US" dirty="0"/>
           </a:p>
@@ -1433,7 +1433,7 @@
           <a:p>
             <a:fld id="{DFCFA4AC-08CC-42CE-BD01-C191750A04EC}" type="datetimeFigureOut">
               <a:rPr lang="en-US" dirty="0"/>
-              <a:t>9/13/2018</a:t>
+              <a:t>9/18/2018</a:t>
             </a:fld>
             <a:endParaRPr lang="en-US" dirty="0"/>
           </a:p>
@@ -1879,7 +1879,7 @@
           <a:p>
             <a:fld id="{1BA7A723-92A7-435B-B681-F25B092FEFEB}" type="datetimeFigureOut">
               <a:rPr lang="en-US" dirty="0"/>
-              <a:t>9/13/2018</a:t>
+              <a:t>9/18/2018</a:t>
             </a:fld>
             <a:endParaRPr lang="en-US" dirty="0"/>
           </a:p>
@@ -1992,7 +1992,7 @@
           <a:p>
             <a:fld id="{4F170639-886C-4FCF-9EAB-ABB5DA3F3F4A}" type="datetimeFigureOut">
               <a:rPr lang="en-US" dirty="0"/>
-              <a:t>9/13/2018</a:t>
+              <a:t>9/18/2018</a:t>
             </a:fld>
             <a:endParaRPr lang="en-US" dirty="0"/>
           </a:p>
@@ -2082,7 +2082,7 @@
           <a:p>
             <a:fld id="{22230651-31F4-45D2-98AE-A2108F41BC07}" type="datetimeFigureOut">
               <a:rPr lang="en-US" dirty="0"/>
-              <a:t>9/13/2018</a:t>
+              <a:t>9/18/2018</a:t>
             </a:fld>
             <a:endParaRPr lang="en-US" dirty="0"/>
           </a:p>
@@ -2364,7 +2364,7 @@
           <a:p>
             <a:fld id="{6F53789A-C914-4DB1-8815-80B5EC7335C5}" type="datetimeFigureOut">
               <a:rPr lang="en-US" dirty="0"/>
-              <a:t>9/13/2018</a:t>
+              <a:t>9/18/2018</a:t>
             </a:fld>
             <a:endParaRPr lang="en-US" dirty="0"/>
           </a:p>
@@ -2684,7 +2684,7 @@
           <a:p>
             <a:fld id="{5E6440AA-91A0-436F-8FDB-C0F939DCAE21}" type="datetimeFigureOut">
               <a:rPr lang="en-US" dirty="0"/>
-              <a:t>9/13/2018</a:t>
+              <a:t>9/18/2018</a:t>
             </a:fld>
             <a:endParaRPr lang="en-US" dirty="0"/>
           </a:p>
@@ -2933,7 +2933,7 @@
           <a:p>
             <a:fld id="{0E59FD0C-5451-4CA0-86AF-E70AE3279989}" type="datetimeFigureOut">
               <a:rPr lang="en-US" dirty="0"/>
-              <a:t>9/13/2018</a:t>
+              <a:t>9/18/2018</a:t>
             </a:fld>
             <a:endParaRPr lang="en-US" dirty="0"/>
           </a:p>
@@ -9445,7 +9445,6 @@
               <a:rPr lang="fr-FR" sz="3200" dirty="0"/>
               <a:t>Sécurité du blog</a:t>
             </a:r>
-            <a:endParaRPr lang="fr-FR" sz="3200" dirty="0"/>
           </a:p>
         </p:txBody>
       </p:sp>
@@ -11142,15 +11141,7 @@
             <a:pPr lvl="1"/>
             <a:r>
               <a:rPr lang="fr-FR" sz="3600" dirty="0" smtClean="0"/>
-              <a:t>Logiciel </a:t>
-            </a:r>
-            <a:r>
-              <a:rPr lang="fr-FR" sz="3600" dirty="0" smtClean="0"/>
-              <a:t>de gestion de </a:t>
-            </a:r>
-            <a:r>
-              <a:rPr lang="fr-FR" sz="3600" dirty="0" smtClean="0"/>
-              <a:t>version</a:t>
+              <a:t>Logiciel de gestion de version</a:t>
             </a:r>
             <a:endParaRPr lang="fr-FR" sz="3600" dirty="0"/>
           </a:p>
@@ -11682,14 +11673,6 @@
               </a:rPr>
               <a:t>Contexte/Enjeux</a:t>
             </a:r>
-            <a:r>
-              <a:rPr lang="fr-FR" sz="2200" dirty="0" smtClean="0">
-                <a:solidFill>
-                  <a:schemeClr val="tx1"/>
-                </a:solidFill>
-              </a:rPr>
-              <a:t/>
-            </a:r>
             <a:br>
               <a:rPr lang="fr-FR" sz="2200" dirty="0" smtClean="0">
                 <a:solidFill>
@@ -11870,15 +11853,7 @@
                   <a:schemeClr val="tx1"/>
                 </a:solidFill>
               </a:rPr>
-              <a:t>sign</a:t>
-            </a:r>
-            <a:r>
-              <a:rPr lang="fr-FR" sz="2000" dirty="0" smtClean="0">
-                <a:solidFill>
-                  <a:schemeClr val="tx1"/>
-                </a:solidFill>
-              </a:rPr>
-              <a:t> pattern</a:t>
+              <a:t>sign pattern</a:t>
             </a:r>
             <a:r>
               <a:rPr lang="fr-FR" sz="2200" dirty="0" smtClean="0">
@@ -11901,15 +11876,7 @@
                   <a:schemeClr val="tx1"/>
                 </a:solidFill>
               </a:rPr>
-              <a:t>Programmation orientée </a:t>
-            </a:r>
-            <a:r>
-              <a:rPr lang="fr-FR" sz="2200" dirty="0" smtClean="0">
-                <a:solidFill>
-                  <a:schemeClr val="tx1"/>
-                </a:solidFill>
-              </a:rPr>
-              <a:t>objet</a:t>
+              <a:t>Programmation orientée objet</a:t>
             </a:r>
             <a:br>
               <a:rPr lang="fr-FR" sz="2200" dirty="0" smtClean="0">
@@ -11925,14 +11892,6 @@
                 </a:solidFill>
               </a:rPr>
               <a:t>Sécurité du blog</a:t>
-            </a:r>
-            <a:r>
-              <a:rPr lang="fr-FR" sz="2200" dirty="0" smtClean="0">
-                <a:solidFill>
-                  <a:schemeClr val="tx1"/>
-                </a:solidFill>
-              </a:rPr>
-              <a:t/>
             </a:r>
             <a:br>
               <a:rPr lang="fr-FR" sz="2200" dirty="0" smtClean="0">
@@ -13778,15 +13737,7 @@
           <a:p>
             <a:r>
               <a:rPr lang="fr-FR" dirty="0" smtClean="0"/>
-              <a:t>Gérer </a:t>
-            </a:r>
-            <a:r>
-              <a:rPr lang="fr-FR" dirty="0" smtClean="0"/>
-              <a:t>les </a:t>
-            </a:r>
-            <a:r>
-              <a:rPr lang="fr-FR" dirty="0" smtClean="0"/>
-              <a:t>commentaires </a:t>
+              <a:t>Gérer les commentaires </a:t>
             </a:r>
             <a:endParaRPr lang="fr-FR" dirty="0"/>
           </a:p>

</xml_diff>